<commit_message>
Added alt-text for image in PPT.
</commit_message>
<xml_diff>
--- a/Whiteboard design session/WDS trainer presentation - Cognitive Services and deep learning.pptx
+++ b/Whiteboard design session/WDS trainer presentation - Cognitive Services and deep learning.pptx
@@ -235,7 +235,7 @@
           <a:p>
             <a:fld id="{52A13B17-C506-4D51-BB37-16B365906619}" type="datetimeFigureOut">
               <a:rPr lang="en-US" smtClean="0"/>
-              <a:t>12/15/19</a:t>
+              <a:t>12/16/2019</a:t>
             </a:fld>
             <a:endParaRPr lang="en-US" dirty="0"/>
           </a:p>
@@ -3163,7 +3163,7 @@
                   <a:prstClr val="black"/>
                 </a:solidFill>
               </a:rPr>
-              <a:t>12/15/19 7:53 PM</a:t>
+              <a:t>12/16/2019 9:05 AM</a:t>
             </a:fld>
             <a:endParaRPr lang="en-US" dirty="0">
               <a:solidFill>
@@ -15813,7 +15813,7 @@
         </p:nvSpPr>
         <p:spPr>
           <a:xfrm>
-            <a:off x="362057" y="1741246"/>
+            <a:off x="291012" y="1189176"/>
             <a:ext cx="10652686" cy="2930033"/>
           </a:xfrm>
           <a:prstGeom prst="rect">
@@ -15920,14 +15920,14 @@
           <p:nvPr>
             <p:extLst>
               <p:ext uri="{D42A27DB-BD31-4B8C-83A1-F6EECF244321}">
-                <p14:modId xmlns:p14="http://schemas.microsoft.com/office/powerpoint/2010/main" val="474751724"/>
+                <p14:modId xmlns:p14="http://schemas.microsoft.com/office/powerpoint/2010/main" val="4122891498"/>
               </p:ext>
             </p:extLst>
           </p:nvPr>
         </p:nvGraphicFramePr>
         <p:xfrm>
-          <a:off x="3095545" y="3791921"/>
-          <a:ext cx="8040154" cy="2420452"/>
+          <a:off x="3236222" y="2800627"/>
+          <a:ext cx="8040154" cy="3767862"/>
         </p:xfrm>
         <a:graphic>
           <a:graphicData uri="http://schemas.openxmlformats.org/drawingml/2006/table">
@@ -15958,14 +15958,14 @@
                     <a:lstStyle/>
                     <a:p>
                       <a:r>
-                        <a:rPr lang="en-US" sz="1300" b="1" i="1" dirty="0">
+                        <a:rPr lang="en-US" sz="1800" b="1" i="1" dirty="0">
                           <a:latin typeface="Segoe UI" panose="020B0502040204020203" pitchFamily="34" charset="0"/>
                           <a:cs typeface="Segoe UI" panose="020B0502040204020203" pitchFamily="34" charset="0"/>
                         </a:rPr>
                         <a:t>Business</a:t>
                       </a:r>
                       <a:r>
-                        <a:rPr lang="en-US" sz="1300" b="1" i="1" kern="1200" dirty="0">
+                        <a:rPr lang="en-US" sz="1800" b="1" i="1" kern="1200" dirty="0">
                           <a:solidFill>
                             <a:schemeClr val="dk1"/>
                           </a:solidFill>
@@ -15978,19 +15978,19 @@
                     </a:p>
                     <a:p>
                       <a:r>
-                        <a:rPr lang="en-US" sz="1300" b="0" i="0" dirty="0">
+                        <a:rPr lang="en-US" sz="1800" b="0" i="0" dirty="0">
                           <a:latin typeface="Segoe UI" panose="020B0502040204020203" pitchFamily="34" charset="0"/>
                           <a:cs typeface="Segoe UI" panose="020B0502040204020203" pitchFamily="34" charset="0"/>
                         </a:rPr>
                         <a:t>(10 minutes)</a:t>
                       </a:r>
                       <a:br>
-                        <a:rPr lang="en-US" sz="1300" b="0" i="0" dirty="0">
+                        <a:rPr lang="en-US" sz="1800" b="0" i="0" dirty="0">
                           <a:latin typeface="Segoe UI" panose="020B0502040204020203" pitchFamily="34" charset="0"/>
                           <a:cs typeface="Segoe UI" panose="020B0502040204020203" pitchFamily="34" charset="0"/>
                         </a:rPr>
                       </a:br>
-                      <a:endParaRPr lang="en-US" sz="1300" b="0" i="0" dirty="0">
+                      <a:endParaRPr lang="en-US" sz="1800" b="0" i="0" dirty="0">
                         <a:latin typeface="Segoe UI" panose="020B0502040204020203" pitchFamily="34" charset="0"/>
                         <a:cs typeface="Segoe UI" panose="020B0502040204020203" pitchFamily="34" charset="0"/>
                       </a:endParaRPr>
@@ -16021,7 +16021,7 @@
                         <a:defRPr/>
                       </a:pPr>
                       <a:r>
-                        <a:rPr lang="en-US" sz="1300" b="0" dirty="0">
+                        <a:rPr lang="en-US" sz="1800" b="0" dirty="0">
                           <a:solidFill>
                             <a:schemeClr val="bg1"/>
                           </a:solidFill>
@@ -16032,7 +16032,7 @@
                       </a:r>
                     </a:p>
                     <a:p>
-                      <a:endParaRPr lang="en-US" sz="1300" b="0" dirty="0">
+                      <a:endParaRPr lang="en-US" sz="1800" b="0" dirty="0">
                         <a:latin typeface="Segoe UI" panose="020B0502040204020203" pitchFamily="34" charset="0"/>
                         <a:cs typeface="Segoe UI" panose="020B0502040204020203" pitchFamily="34" charset="0"/>
                       </a:endParaRPr>
@@ -16053,7 +16053,7 @@
                     <a:lstStyle/>
                     <a:p>
                       <a:r>
-                        <a:rPr lang="en-US" sz="1300" b="1" i="1" dirty="0">
+                        <a:rPr lang="en-US" sz="1800" b="1" i="1" dirty="0">
                           <a:latin typeface="Segoe UI" panose="020B0502040204020203" pitchFamily="34" charset="0"/>
                           <a:cs typeface="Segoe UI" panose="020B0502040204020203" pitchFamily="34" charset="0"/>
                         </a:rPr>
@@ -16063,7 +16063,7 @@
                     <a:p>
                       <a:pPr marL="0" algn="l" defTabSz="932742" rtl="0" eaLnBrk="1" latinLnBrk="0" hangingPunct="1"/>
                       <a:r>
-                        <a:rPr lang="en-US" sz="1300" b="0" i="0" kern="1200" dirty="0">
+                        <a:rPr lang="en-US" sz="1800" b="0" i="0" kern="1200" dirty="0">
                           <a:solidFill>
                             <a:schemeClr val="dk1"/>
                           </a:solidFill>
@@ -16074,7 +16074,7 @@
                         <a:t>(35 minutes)</a:t>
                       </a:r>
                       <a:br>
-                        <a:rPr lang="en-US" sz="1300" b="0" i="0" kern="1200" dirty="0">
+                        <a:rPr lang="en-US" sz="1800" b="0" i="0" kern="1200" dirty="0">
                           <a:solidFill>
                             <a:schemeClr val="dk1"/>
                           </a:solidFill>
@@ -16083,7 +16083,7 @@
                           <a:cs typeface="Segoe UI" panose="020B0502040204020203" pitchFamily="34" charset="0"/>
                         </a:rPr>
                       </a:br>
-                      <a:endParaRPr lang="en-US" sz="1300" b="0" i="0" kern="1200" dirty="0">
+                      <a:endParaRPr lang="en-US" sz="1800" b="0" i="0" kern="1200" dirty="0">
                         <a:solidFill>
                           <a:schemeClr val="dk1"/>
                         </a:solidFill>
@@ -16118,7 +16118,7 @@
                         <a:defRPr/>
                       </a:pPr>
                       <a:r>
-                        <a:rPr lang="en-US" sz="1300" kern="1200" baseline="0" dirty="0">
+                        <a:rPr lang="en-US" sz="1800" kern="1200" baseline="0" dirty="0">
                           <a:solidFill>
                             <a:schemeClr val="bg1"/>
                           </a:solidFill>
@@ -16130,7 +16130,7 @@
                       </a:r>
                     </a:p>
                     <a:p>
-                      <a:endParaRPr lang="en-US" sz="1300" dirty="0">
+                      <a:endParaRPr lang="en-US" sz="1800" dirty="0">
                         <a:latin typeface="Segoe UI" panose="020B0502040204020203" pitchFamily="34" charset="0"/>
                         <a:cs typeface="Segoe UI" panose="020B0502040204020203" pitchFamily="34" charset="0"/>
                       </a:endParaRPr>
@@ -16151,7 +16151,7 @@
                     <a:lstStyle/>
                     <a:p>
                       <a:r>
-                        <a:rPr lang="en-US" sz="1300" b="1" i="1" dirty="0">
+                        <a:rPr lang="en-US" sz="1800" b="1" i="1" dirty="0">
                           <a:latin typeface="Segoe UI" panose="020B0502040204020203" pitchFamily="34" charset="0"/>
                           <a:cs typeface="Segoe UI" panose="020B0502040204020203" pitchFamily="34" charset="0"/>
                         </a:rPr>
@@ -16177,7 +16177,7 @@
                         <a:defRPr/>
                       </a:pPr>
                       <a:r>
-                        <a:rPr lang="en-US" sz="1300" b="0" i="0" kern="1200" dirty="0">
+                        <a:rPr lang="en-US" sz="1800" b="0" i="0" kern="1200" dirty="0">
                           <a:solidFill>
                             <a:schemeClr val="dk1"/>
                           </a:solidFill>
@@ -16189,7 +16189,7 @@
                       </a:r>
                     </a:p>
                     <a:p>
-                      <a:endParaRPr lang="en-US" sz="1300" b="1" i="1" dirty="0">
+                      <a:endParaRPr lang="en-US" sz="1800" b="1" i="1" dirty="0">
                         <a:latin typeface="Segoe UI" panose="020B0502040204020203" pitchFamily="34" charset="0"/>
                         <a:cs typeface="Segoe UI" panose="020B0502040204020203" pitchFamily="34" charset="0"/>
                       </a:endParaRPr>
@@ -16207,7 +16207,7 @@
                         <a:buChar char="•"/>
                       </a:pPr>
                       <a:r>
-                        <a:rPr lang="en-US" sz="1300" dirty="0">
+                        <a:rPr lang="en-US" sz="1800" dirty="0">
                           <a:latin typeface="Segoe UI" panose="020B0502040204020203" pitchFamily="34" charset="0"/>
                           <a:cs typeface="Segoe UI" panose="020B0502040204020203" pitchFamily="34" charset="0"/>
                         </a:rPr>
@@ -16220,7 +16220,7 @@
                         <a:buChar char="•"/>
                       </a:pPr>
                       <a:r>
-                        <a:rPr lang="en-US" sz="1300" dirty="0">
+                        <a:rPr lang="en-US" sz="1800" dirty="0">
                           <a:latin typeface="Segoe UI" panose="020B0502040204020203" pitchFamily="34" charset="0"/>
                           <a:cs typeface="Segoe UI" panose="020B0502040204020203" pitchFamily="34" charset="0"/>
                         </a:rPr>
@@ -16233,7 +16233,7 @@
                         <a:buChar char="•"/>
                       </a:pPr>
                       <a:r>
-                        <a:rPr lang="en-US" sz="1300" dirty="0">
+                        <a:rPr lang="en-US" sz="1800" dirty="0">
                           <a:latin typeface="Segoe UI" panose="020B0502040204020203" pitchFamily="34" charset="0"/>
                           <a:cs typeface="Segoe UI" panose="020B0502040204020203" pitchFamily="34" charset="0"/>
                         </a:rPr>
@@ -16246,19 +16246,19 @@
                         <a:buChar char="•"/>
                       </a:pPr>
                       <a:r>
-                        <a:rPr lang="en-US" sz="1300" dirty="0">
+                        <a:rPr lang="en-US" sz="1800" dirty="0">
                           <a:latin typeface="Segoe UI" panose="020B0502040204020203" pitchFamily="34" charset="0"/>
                           <a:cs typeface="Segoe UI" panose="020B0502040204020203" pitchFamily="34" charset="0"/>
                         </a:rPr>
                         <a:t>Prepare for a 15-minute presentation to the customer.</a:t>
                       </a:r>
                       <a:br>
-                        <a:rPr lang="en-US" sz="1300" dirty="0">
+                        <a:rPr lang="en-US" sz="1800" dirty="0">
                           <a:latin typeface="Segoe UI" panose="020B0502040204020203" pitchFamily="34" charset="0"/>
                           <a:cs typeface="Segoe UI" panose="020B0502040204020203" pitchFamily="34" charset="0"/>
                         </a:rPr>
                       </a:br>
-                      <a:endParaRPr lang="en-US" sz="1300" dirty="0">
+                      <a:endParaRPr lang="en-US" sz="1800" dirty="0">
                         <a:latin typeface="Segoe UI" panose="020B0502040204020203" pitchFamily="34" charset="0"/>
                         <a:cs typeface="Segoe UI" panose="020B0502040204020203" pitchFamily="34" charset="0"/>
                       </a:endParaRPr>
@@ -17136,7 +17136,7 @@
       </p:pic>
       <p:pic>
         <p:nvPicPr>
-          <p:cNvPr id="4" name="Picture 3">
+          <p:cNvPr id="4" name="Picture 3" descr="High level architecture diagram of the preferred solution.">
             <a:extLst>
               <a:ext uri="{FF2B5EF4-FFF2-40B4-BE49-F238E27FC236}">
                 <a16:creationId xmlns:a16="http://schemas.microsoft.com/office/drawing/2014/main" id="{3AF682CB-71B7-144B-B00C-C6E80DA789D0}"/>
@@ -17162,7 +17162,7 @@
         </p:blipFill>
         <p:spPr>
           <a:xfrm>
-            <a:off x="1298448" y="1819656"/>
+            <a:off x="1256245" y="1833724"/>
             <a:ext cx="5440680" cy="4836160"/>
           </a:xfrm>
           <a:prstGeom prst="rect">
@@ -18968,7 +18968,7 @@
       </p:sp>
       <p:pic>
         <p:nvPicPr>
-          <p:cNvPr id="7" name="Picture 6">
+          <p:cNvPr id="7" name="Picture 6" descr="Classifying clam-text data diagram.  Diagram depicts the flow of the neural network classification.">
             <a:extLst>
               <a:ext uri="{FF2B5EF4-FFF2-40B4-BE49-F238E27FC236}">
                 <a16:creationId xmlns:a16="http://schemas.microsoft.com/office/drawing/2014/main" id="{5ACB076E-8BB8-BA42-AC1D-D41DB54984B6}"/>
@@ -18981,7 +18981,7 @@
           <p:nvPr/>
         </p:nvPicPr>
         <p:blipFill>
-          <a:blip r:embed="rId3">
+          <a:blip r:embed="rId3" cstate="print">
             <a:extLst>
               <a:ext uri="{28A0092B-C50C-407E-A947-70E740481C1C}">
                 <a14:useLocalDpi xmlns:a14="http://schemas.microsoft.com/office/drawing/2010/main" val="0"/>
@@ -21396,7 +21396,7 @@
       </p:sp>
       <p:sp>
         <p:nvSpPr>
-          <p:cNvPr id="4" name="Rectangle 3">
+          <p:cNvPr id="4" name="Rectangle 3" descr="An example of the JSON response from the processing.">
             <a:extLst>
               <a:ext uri="{FF2B5EF4-FFF2-40B4-BE49-F238E27FC236}">
                 <a16:creationId xmlns:a16="http://schemas.microsoft.com/office/drawing/2014/main" id="{2834E07D-362C-4CBB-B7E4-ABD61E2A0F03}"/>
@@ -22450,7 +22450,7 @@
       </p:sp>
       <p:sp>
         <p:nvSpPr>
-          <p:cNvPr id="4" name="Rectangle 3">
+          <p:cNvPr id="4" name="Rectangle 3" descr="An example of the JSON response from the processing.">
             <a:extLst>
               <a:ext uri="{FF2B5EF4-FFF2-40B4-BE49-F238E27FC236}">
                 <a16:creationId xmlns:a16="http://schemas.microsoft.com/office/drawing/2014/main" id="{2834E07D-362C-4CBB-B7E4-ABD61E2A0F03}"/>

</xml_diff>

<commit_message>
Updated the reading order.
</commit_message>
<xml_diff>
--- a/Whiteboard design session/WDS trainer presentation - Cognitive Services and deep learning.pptx
+++ b/Whiteboard design session/WDS trainer presentation - Cognitive Services and deep learning.pptx
@@ -3163,7 +3163,7 @@
                   <a:prstClr val="black"/>
                 </a:solidFill>
               </a:rPr>
-              <a:t>12/16/2019 9:05 AM</a:t>
+              <a:t>12/16/2019 9:16 AM</a:t>
             </a:fld>
             <a:endParaRPr lang="en-US" dirty="0">
               <a:solidFill>
@@ -17094,6 +17094,42 @@
       </p:sp>
       <p:pic>
         <p:nvPicPr>
+          <p:cNvPr id="4" name="Picture 3" descr="High level architecture diagram of the preferred solution.">
+            <a:extLst>
+              <a:ext uri="{FF2B5EF4-FFF2-40B4-BE49-F238E27FC236}">
+                <a16:creationId xmlns:a16="http://schemas.microsoft.com/office/drawing/2014/main" id="{3AF682CB-71B7-144B-B00C-C6E80DA789D0}"/>
+              </a:ext>
+            </a:extLst>
+          </p:cNvPr>
+          <p:cNvPicPr>
+            <a:picLocks noChangeAspect="1"/>
+          </p:cNvPicPr>
+          <p:nvPr/>
+        </p:nvPicPr>
+        <p:blipFill>
+          <a:blip r:embed="rId3">
+            <a:extLst>
+              <a:ext uri="{28A0092B-C50C-407E-A947-70E740481C1C}">
+                <a14:useLocalDpi xmlns:a14="http://schemas.microsoft.com/office/drawing/2010/main" val="0"/>
+              </a:ext>
+            </a:extLst>
+          </a:blip>
+          <a:stretch>
+            <a:fillRect/>
+          </a:stretch>
+        </p:blipFill>
+        <p:spPr>
+          <a:xfrm>
+            <a:off x="1256245" y="1833724"/>
+            <a:ext cx="5440680" cy="4836160"/>
+          </a:xfrm>
+          <a:prstGeom prst="rect">
+            <a:avLst/>
+          </a:prstGeom>
+        </p:spPr>
+      </p:pic>
+      <p:pic>
+        <p:nvPicPr>
           <p:cNvPr id="7" name="Picture 6" descr="In the Claim image processing diagram, Function (claim text processing) points to Sentiment, classification and summary, Text Analytics, and Containerized services comprised of Classification Service and Summary Service." title="Claim image processing diagram">
             <a:extLst>
               <a:ext uri="{FF2B5EF4-FFF2-40B4-BE49-F238E27FC236}">
@@ -17105,7 +17141,7 @@
           <p:nvPr/>
         </p:nvPicPr>
         <p:blipFill>
-          <a:blip r:embed="rId3">
+          <a:blip r:embed="rId4">
             <a:extLst>
               <a:ext uri="{28A0092B-C50C-407E-A947-70E740481C1C}">
                 <a14:useLocalDpi xmlns:a14="http://schemas.microsoft.com/office/drawing/2010/main" val="0"/>
@@ -17132,42 +17168,6 @@
               </a:schemeClr>
             </a:solidFill>
           </a:ln>
-        </p:spPr>
-      </p:pic>
-      <p:pic>
-        <p:nvPicPr>
-          <p:cNvPr id="4" name="Picture 3" descr="High level architecture diagram of the preferred solution.">
-            <a:extLst>
-              <a:ext uri="{FF2B5EF4-FFF2-40B4-BE49-F238E27FC236}">
-                <a16:creationId xmlns:a16="http://schemas.microsoft.com/office/drawing/2014/main" id="{3AF682CB-71B7-144B-B00C-C6E80DA789D0}"/>
-              </a:ext>
-            </a:extLst>
-          </p:cNvPr>
-          <p:cNvPicPr>
-            <a:picLocks noChangeAspect="1"/>
-          </p:cNvPicPr>
-          <p:nvPr/>
-        </p:nvPicPr>
-        <p:blipFill>
-          <a:blip r:embed="rId4">
-            <a:extLst>
-              <a:ext uri="{28A0092B-C50C-407E-A947-70E740481C1C}">
-                <a14:useLocalDpi xmlns:a14="http://schemas.microsoft.com/office/drawing/2010/main" val="0"/>
-              </a:ext>
-            </a:extLst>
-          </a:blip>
-          <a:stretch>
-            <a:fillRect/>
-          </a:stretch>
-        </p:blipFill>
-        <p:spPr>
-          <a:xfrm>
-            <a:off x="1256245" y="1833724"/>
-            <a:ext cx="5440680" cy="4836160"/>
-          </a:xfrm>
-          <a:prstGeom prst="rect">
-            <a:avLst/>
-          </a:prstGeom>
         </p:spPr>
       </p:pic>
     </p:spTree>
@@ -17308,56 +17308,6 @@
           </a:p>
         </p:txBody>
       </p:sp>
-      <p:sp>
-        <p:nvSpPr>
-          <p:cNvPr id="3" name="Content Placeholder 2"/>
-          <p:cNvSpPr>
-            <a:spLocks noGrp="1"/>
-          </p:cNvSpPr>
-          <p:nvPr>
-            <p:ph type="body" sz="quarter" idx="10"/>
-          </p:nvPr>
-        </p:nvSpPr>
-        <p:spPr>
-          <a:xfrm>
-            <a:off x="9443754" y="3219186"/>
-            <a:ext cx="2282217" cy="2052030"/>
-          </a:xfrm>
-        </p:spPr>
-        <p:txBody>
-          <a:bodyPr>
-            <a:noAutofit/>
-          </a:bodyPr>
-          <a:lstStyle/>
-          <a:p>
-            <a:pPr marL="0" indent="0">
-              <a:buNone/>
-            </a:pPr>
-            <a:r>
-              <a:rPr lang="en-US" sz="2800" dirty="0">
-                <a:solidFill>
-                  <a:schemeClr val="tx1"/>
-                </a:solidFill>
-                <a:latin typeface="+mn-lt"/>
-              </a:rPr>
-              <a:t>General pipeline for text analytics</a:t>
-            </a:r>
-          </a:p>
-          <a:p>
-            <a:pPr marL="0" indent="0">
-              <a:spcAft>
-                <a:spcPts val="882"/>
-              </a:spcAft>
-              <a:buNone/>
-            </a:pPr>
-            <a:endParaRPr lang="en-US" sz="1400" dirty="0">
-              <a:solidFill>
-                <a:schemeClr val="tx1"/>
-              </a:solidFill>
-            </a:endParaRPr>
-          </a:p>
-        </p:txBody>
-      </p:sp>
       <p:pic>
         <p:nvPicPr>
           <p:cNvPr id="4" name="Picture 3" descr="In the high-level steps for traning a classification model with text diagram, Document labels points to Supervised ML or DL Algorithm, which points to Classification Model. Documents points to Text Normalization, which points to Feature Extraction, which points to Supervised ML or DL Algorithm." title="High-level steps for traning a classification model with text"/>
@@ -17388,6 +17338,56 @@
           </a:prstGeom>
         </p:spPr>
       </p:pic>
+      <p:sp>
+        <p:nvSpPr>
+          <p:cNvPr id="3" name="Content Placeholder 2"/>
+          <p:cNvSpPr>
+            <a:spLocks noGrp="1"/>
+          </p:cNvSpPr>
+          <p:nvPr>
+            <p:ph type="body" sz="quarter" idx="10"/>
+          </p:nvPr>
+        </p:nvSpPr>
+        <p:spPr>
+          <a:xfrm>
+            <a:off x="9443754" y="3219186"/>
+            <a:ext cx="2282217" cy="2052030"/>
+          </a:xfrm>
+        </p:spPr>
+        <p:txBody>
+          <a:bodyPr>
+            <a:noAutofit/>
+          </a:bodyPr>
+          <a:lstStyle/>
+          <a:p>
+            <a:pPr marL="0" indent="0">
+              <a:buNone/>
+            </a:pPr>
+            <a:r>
+              <a:rPr lang="en-US" sz="2800" dirty="0">
+                <a:solidFill>
+                  <a:schemeClr val="tx1"/>
+                </a:solidFill>
+                <a:latin typeface="+mn-lt"/>
+              </a:rPr>
+              <a:t>General pipeline for text analytics</a:t>
+            </a:r>
+          </a:p>
+          <a:p>
+            <a:pPr marL="0" indent="0">
+              <a:spcAft>
+                <a:spcPts val="882"/>
+              </a:spcAft>
+              <a:buNone/>
+            </a:pPr>
+            <a:endParaRPr lang="en-US" sz="1400" dirty="0">
+              <a:solidFill>
+                <a:schemeClr val="tx1"/>
+              </a:solidFill>
+            </a:endParaRPr>
+          </a:p>
+        </p:txBody>
+      </p:sp>
     </p:spTree>
     <p:extLst>
       <p:ext uri="{BB962C8B-B14F-4D97-AF65-F5344CB8AC3E}">
@@ -24208,42 +24208,6 @@
               </a:solidFill>
               <a:latin typeface="Segoe UI" panose="020B0502040204020203" pitchFamily="34" charset="0"/>
             </a:endParaRPr>
-          </a:p>
-        </p:txBody>
-      </p:sp>
-      <p:sp>
-        <p:nvSpPr>
-          <p:cNvPr id="3" name="Content Placeholder 2"/>
-          <p:cNvSpPr>
-            <a:spLocks noGrp="1"/>
-          </p:cNvSpPr>
-          <p:nvPr>
-            <p:ph type="body" sz="quarter" idx="10"/>
-          </p:nvPr>
-        </p:nvSpPr>
-        <p:spPr>
-          <a:xfrm>
-            <a:off x="269240" y="1189177"/>
-            <a:ext cx="11302076" cy="4990906"/>
-          </a:xfrm>
-        </p:spPr>
-        <p:txBody>
-          <a:bodyPr>
-            <a:noAutofit/>
-          </a:bodyPr>
-          <a:lstStyle/>
-          <a:p>
-            <a:pPr marL="0" indent="0">
-              <a:buNone/>
-            </a:pPr>
-            <a:r>
-              <a:rPr lang="en-US" sz="3600" dirty="0"/>
-              <a:t>Two sets of issues where they envision amplifying the capabilities of their agents with AI:</a:t>
-            </a:r>
-            <a:br>
-              <a:rPr lang="en-US" sz="2800" dirty="0"/>
-            </a:br>
-            <a:endParaRPr lang="en-US" sz="2800" dirty="0"/>
           </a:p>
         </p:txBody>
       </p:sp>
@@ -24582,12 +24546,48 @@
           </a:p>
         </p:txBody>
       </p:sp>
+      <p:sp>
+        <p:nvSpPr>
+          <p:cNvPr id="3" name="Content Placeholder 2"/>
+          <p:cNvSpPr>
+            <a:spLocks noGrp="1"/>
+          </p:cNvSpPr>
+          <p:nvPr>
+            <p:ph type="body" sz="quarter" idx="10"/>
+          </p:nvPr>
+        </p:nvSpPr>
+        <p:spPr>
+          <a:xfrm>
+            <a:off x="269240" y="1189177"/>
+            <a:ext cx="11302076" cy="4990906"/>
+          </a:xfrm>
+        </p:spPr>
+        <p:txBody>
+          <a:bodyPr>
+            <a:noAutofit/>
+          </a:bodyPr>
+          <a:lstStyle/>
+          <a:p>
+            <a:pPr marL="0" indent="0">
+              <a:buNone/>
+            </a:pPr>
+            <a:r>
+              <a:rPr lang="en-US" sz="3600" dirty="0"/>
+              <a:t>Two sets of issues where they envision amplifying the capabilities of their agents with AI:</a:t>
+            </a:r>
+            <a:br>
+              <a:rPr lang="en-US" sz="2800" dirty="0"/>
+            </a:br>
+            <a:endParaRPr lang="en-US" sz="2800" dirty="0"/>
+          </a:p>
+        </p:txBody>
+      </p:sp>
       <p:pic>
         <p:nvPicPr>
-          <p:cNvPr id="6" name="Graphic 5" descr="Camera icon" title="Camera icon">
+          <p:cNvPr id="9" name="Graphic 8" descr="Document icon" title="Document icon">
             <a:extLst>
               <a:ext uri="{FF2B5EF4-FFF2-40B4-BE49-F238E27FC236}">
-                <a16:creationId xmlns:a16="http://schemas.microsoft.com/office/drawing/2014/main" id="{CB31A0D8-66D0-4EA6-85BA-5BDB60A60FB5}"/>
+                <a16:creationId xmlns:a16="http://schemas.microsoft.com/office/drawing/2014/main" id="{3921AFBD-AD85-44C2-84BD-B02CA71ACC29}"/>
               </a:ext>
             </a:extLst>
           </p:cNvPr>
@@ -24613,8 +24613,8 @@
         </p:blipFill>
         <p:spPr>
           <a:xfrm>
-            <a:off x="759386" y="4625853"/>
-            <a:ext cx="1486376" cy="1486376"/>
+            <a:off x="888542" y="2672136"/>
+            <a:ext cx="1213946" cy="1213946"/>
           </a:xfrm>
           <a:prstGeom prst="rect">
             <a:avLst/>
@@ -24623,10 +24623,10 @@
       </p:pic>
       <p:pic>
         <p:nvPicPr>
-          <p:cNvPr id="9" name="Graphic 8" descr="Document icon" title="Document icon">
+          <p:cNvPr id="6" name="Graphic 5" descr="Camera icon" title="Camera icon">
             <a:extLst>
               <a:ext uri="{FF2B5EF4-FFF2-40B4-BE49-F238E27FC236}">
-                <a16:creationId xmlns:a16="http://schemas.microsoft.com/office/drawing/2014/main" id="{3921AFBD-AD85-44C2-84BD-B02CA71ACC29}"/>
+                <a16:creationId xmlns:a16="http://schemas.microsoft.com/office/drawing/2014/main" id="{CB31A0D8-66D0-4EA6-85BA-5BDB60A60FB5}"/>
               </a:ext>
             </a:extLst>
           </p:cNvPr>
@@ -24652,8 +24652,8 @@
         </p:blipFill>
         <p:spPr>
           <a:xfrm>
-            <a:off x="888542" y="2672136"/>
-            <a:ext cx="1213946" cy="1213946"/>
+            <a:off x="759386" y="4625853"/>
+            <a:ext cx="1486376" cy="1486376"/>
           </a:xfrm>
           <a:prstGeom prst="rect">
             <a:avLst/>

</xml_diff>

<commit_message>
June 2020 updates #40 #41 #42
</commit_message>
<xml_diff>
--- a/Whiteboard design session/WDS trainer presentation - Cognitive Services and deep learning.pptx
+++ b/Whiteboard design session/WDS trainer presentation - Cognitive Services and deep learning.pptx
@@ -235,7 +235,7 @@
           <a:p>
             <a:fld id="{52A13B17-C506-4D51-BB37-16B365906619}" type="datetimeFigureOut">
               <a:rPr lang="en-US" smtClean="0"/>
-              <a:t>12/20/19</a:t>
+              <a:t>6/24/20</a:t>
             </a:fld>
             <a:endParaRPr lang="en-US" dirty="0"/>
           </a:p>
@@ -1137,7 +1137,31 @@
                 <a:ea typeface="+mn-ea"/>
                 <a:cs typeface="+mn-cs"/>
               </a:rPr>
-              <a:t>The claim image processing functions would invoke the Computer Vision Cognitive Service for automatically creating the caption and the tags from any supplied claim images. A mixture of pre-built AI, in the form of Cognitive Services and custom AI in the form of Azure ML services, would be used to process the claim text. The models used for processing the claims text would be trained in Azure Notebooks. These models could also then be directly deployed from Azure Notebooks using the Azure Machine Learning Service Python SDK. Azure Functions would be used to coordinate the calls to the classifications and summary AI services, which would run as containerized web services in Azure Container Service, while the Text Analytics API could be invoked directly to provide a sentiment score for each claim text.</a:t>
+              <a:t>The claim image processing functions would invoke the Computer Vision Cognitive Service for automatically creating the caption and the tags from any supplied claim images. A mixture of pre-built AI, in the form of Cognitive Services and custom AI in the form of Azure ML services, would be used to process the claim text. The models used for processing the claims text would be trained in Azure Machine Learning compute instance. These models could also then be directly deployed from Azure Machine Learning </a:t>
+            </a:r>
+            <a:r>
+              <a:rPr lang="en-US" sz="1200" b="0" kern="1200">
+                <a:solidFill>
+                  <a:schemeClr val="tx1"/>
+                </a:solidFill>
+                <a:effectLst/>
+                <a:latin typeface="+mn-lt"/>
+                <a:ea typeface="+mn-ea"/>
+                <a:cs typeface="+mn-cs"/>
+              </a:rPr>
+              <a:t>compute instance using </a:t>
+            </a:r>
+            <a:r>
+              <a:rPr lang="en-US" sz="1200" b="0" kern="1200" dirty="0">
+                <a:solidFill>
+                  <a:schemeClr val="tx1"/>
+                </a:solidFill>
+                <a:effectLst/>
+                <a:latin typeface="+mn-lt"/>
+                <a:ea typeface="+mn-ea"/>
+                <a:cs typeface="+mn-cs"/>
+              </a:rPr>
+              <a:t>the Azure Machine Learning Service Python SDK. Azure Functions would be used to coordinate the calls to the classifications and summary AI services, which would run as containerized web services in Azure Container Service, while the Text Analytics API could be invoked directly to provide a sentiment score for each claim text.</a:t>
             </a:r>
           </a:p>
           <a:p>
@@ -3163,7 +3187,7 @@
                   <a:prstClr val="black"/>
                 </a:solidFill>
               </a:rPr>
-              <a:t>12/20/19 8:17 PM</a:t>
+              <a:t>6/24/20 3:14 PM</a:t>
             </a:fld>
             <a:endParaRPr lang="en-US" dirty="0">
               <a:solidFill>
@@ -18620,7 +18644,7 @@
         <p:spPr>
           <a:xfrm>
             <a:off x="269240" y="1189176"/>
-            <a:ext cx="10748129" cy="5336846"/>
+            <a:ext cx="10748129" cy="5004447"/>
           </a:xfrm>
           <a:prstGeom prst="rect">
             <a:avLst/>
@@ -18667,7 +18691,7 @@
             </a:pPr>
             <a:r>
               <a:rPr lang="en-US" dirty="0"/>
-              <a:t>Azure Notebooks</a:t>
+              <a:t>Cognitive Services</a:t>
             </a:r>
           </a:p>
           <a:p>
@@ -18677,7 +18701,7 @@
             </a:pPr>
             <a:r>
               <a:rPr lang="en-US" dirty="0"/>
-              <a:t>Cognitive Services</a:t>
+              <a:t>Computer Vision API</a:t>
             </a:r>
           </a:p>
           <a:p>
@@ -18687,7 +18711,7 @@
             </a:pPr>
             <a:r>
               <a:rPr lang="en-US" dirty="0"/>
-              <a:t>Computer Vision API</a:t>
+              <a:t>Text Analytics API</a:t>
             </a:r>
           </a:p>
           <a:p>
@@ -18696,9 +18720,10 @@
               <a:buChar char="•"/>
             </a:pPr>
             <a:r>
-              <a:rPr lang="en-US" dirty="0"/>
-              <a:t>Text Analytics API</a:t>
-            </a:r>
+              <a:rPr lang="en-US" dirty="0" err="1"/>
+              <a:t>Keras</a:t>
+            </a:r>
+            <a:endParaRPr lang="en-US" dirty="0"/>
           </a:p>
           <a:p>
             <a:pPr marL="285750" indent="-285750">
@@ -18706,10 +18731,9 @@
               <a:buChar char="•"/>
             </a:pPr>
             <a:r>
-              <a:rPr lang="en-US" dirty="0" err="1"/>
-              <a:t>Keras</a:t>
-            </a:r>
-            <a:endParaRPr lang="en-US" dirty="0"/>
+              <a:rPr lang="en-US" dirty="0"/>
+              <a:t>TensorFlow</a:t>
+            </a:r>
           </a:p>
           <a:p>
             <a:pPr marL="285750" indent="-285750">
@@ -18718,19 +18742,8 @@
             </a:pPr>
             <a:r>
               <a:rPr lang="en-US" dirty="0"/>
-              <a:t>TensorFlow</a:t>
-            </a:r>
-          </a:p>
-          <a:p>
-            <a:pPr>
-              <a:lnSpc>
-                <a:spcPct val="90000"/>
-              </a:lnSpc>
-              <a:spcAft>
-                <a:spcPts val="600"/>
-              </a:spcAft>
-            </a:pPr>
-            <a:endParaRPr lang="en-US" sz="2400" dirty="0"/>
+              <a:t>ONNX</a:t>
+            </a:r>
           </a:p>
         </p:txBody>
       </p:sp>

</xml_diff>

<commit_message>
fixes based on SME review for Nov 2021 updates
</commit_message>
<xml_diff>
--- a/Whiteboard design session/WDS trainer presentation - Cognitive Services and deep learning.pptx
+++ b/Whiteboard design session/WDS trainer presentation - Cognitive Services and deep learning.pptx
@@ -6,7 +6,7 @@
     <p:sldMasterId id="2147483665" r:id="rId2"/>
   </p:sldMasterIdLst>
   <p:notesMasterIdLst>
-    <p:notesMasterId r:id="rId35"/>
+    <p:notesMasterId r:id="rId36"/>
   </p:notesMasterIdLst>
   <p:sldIdLst>
     <p:sldId id="300" r:id="rId3"/>
@@ -35,12 +35,13 @@
     <p:sldId id="346" r:id="rId26"/>
     <p:sldId id="345" r:id="rId27"/>
     <p:sldId id="331" r:id="rId28"/>
-    <p:sldId id="332" r:id="rId29"/>
-    <p:sldId id="338" r:id="rId30"/>
-    <p:sldId id="340" r:id="rId31"/>
-    <p:sldId id="341" r:id="rId32"/>
-    <p:sldId id="339" r:id="rId33"/>
-    <p:sldId id="315" r:id="rId34"/>
+    <p:sldId id="347" r:id="rId29"/>
+    <p:sldId id="332" r:id="rId30"/>
+    <p:sldId id="338" r:id="rId31"/>
+    <p:sldId id="340" r:id="rId32"/>
+    <p:sldId id="341" r:id="rId33"/>
+    <p:sldId id="339" r:id="rId34"/>
+    <p:sldId id="315" r:id="rId35"/>
   </p:sldIdLst>
   <p:sldSz cx="12192000" cy="6858000"/>
   <p:notesSz cx="6858000" cy="9144000"/>
@@ -232,7 +233,7 @@
           <a:p>
             <a:fld id="{52A13B17-C506-4D51-BB37-16B365906619}" type="datetimeFigureOut">
               <a:rPr lang="en-US" smtClean="0"/>
-              <a:t>10/20/21</a:t>
+              <a:t>11/10/21</a:t>
             </a:fld>
             <a:endParaRPr lang="en-US" dirty="0"/>
           </a:p>
@@ -2393,7 +2394,7 @@
     </p:spTree>
     <p:extLst>
       <p:ext uri="{BB962C8B-B14F-4D97-AF65-F5344CB8AC3E}">
-        <p14:creationId xmlns:p14="http://schemas.microsoft.com/office/powerpoint/2010/main" val="183691693"/>
+        <p14:creationId xmlns:p14="http://schemas.microsoft.com/office/powerpoint/2010/main" val="1554850918"/>
       </p:ext>
     </p:extLst>
   </p:cSld>
@@ -2477,7 +2478,7 @@
     </p:spTree>
     <p:extLst>
       <p:ext uri="{BB962C8B-B14F-4D97-AF65-F5344CB8AC3E}">
-        <p14:creationId xmlns:p14="http://schemas.microsoft.com/office/powerpoint/2010/main" val="376445730"/>
+        <p14:creationId xmlns:p14="http://schemas.microsoft.com/office/powerpoint/2010/main" val="183691693"/>
       </p:ext>
     </p:extLst>
   </p:cSld>
@@ -2561,7 +2562,7 @@
     </p:spTree>
     <p:extLst>
       <p:ext uri="{BB962C8B-B14F-4D97-AF65-F5344CB8AC3E}">
-        <p14:creationId xmlns:p14="http://schemas.microsoft.com/office/powerpoint/2010/main" val="366044158"/>
+        <p14:creationId xmlns:p14="http://schemas.microsoft.com/office/powerpoint/2010/main" val="376445730"/>
       </p:ext>
     </p:extLst>
   </p:cSld>
@@ -2729,7 +2730,7 @@
     </p:spTree>
     <p:extLst>
       <p:ext uri="{BB962C8B-B14F-4D97-AF65-F5344CB8AC3E}">
-        <p14:creationId xmlns:p14="http://schemas.microsoft.com/office/powerpoint/2010/main" val="2866128362"/>
+        <p14:creationId xmlns:p14="http://schemas.microsoft.com/office/powerpoint/2010/main" val="366044158"/>
       </p:ext>
     </p:extLst>
   </p:cSld>
@@ -2813,6 +2814,90 @@
     </p:spTree>
     <p:extLst>
       <p:ext uri="{BB962C8B-B14F-4D97-AF65-F5344CB8AC3E}">
+        <p14:creationId xmlns:p14="http://schemas.microsoft.com/office/powerpoint/2010/main" val="2866128362"/>
+      </p:ext>
+    </p:extLst>
+  </p:cSld>
+  <p:clrMapOvr>
+    <a:masterClrMapping/>
+  </p:clrMapOvr>
+</p:notes>
+</file>
+
+<file path=ppt/notesSlides/notesSlide32.xml><?xml version="1.0" encoding="utf-8"?>
+<p:notes xmlns:a="http://schemas.openxmlformats.org/drawingml/2006/main" xmlns:r="http://schemas.openxmlformats.org/officeDocument/2006/relationships" xmlns:p="http://schemas.openxmlformats.org/presentationml/2006/main">
+  <p:cSld>
+    <p:spTree>
+      <p:nvGrpSpPr>
+        <p:cNvPr id="1" name=""/>
+        <p:cNvGrpSpPr/>
+        <p:nvPr/>
+      </p:nvGrpSpPr>
+      <p:grpSpPr>
+        <a:xfrm>
+          <a:off x="0" y="0"/>
+          <a:ext cx="0" cy="0"/>
+          <a:chOff x="0" y="0"/>
+          <a:chExt cx="0" cy="0"/>
+        </a:xfrm>
+      </p:grpSpPr>
+      <p:sp>
+        <p:nvSpPr>
+          <p:cNvPr id="2" name="Slide Image Placeholder 1"/>
+          <p:cNvSpPr>
+            <a:spLocks noGrp="1" noRot="1" noChangeAspect="1"/>
+          </p:cNvSpPr>
+          <p:nvPr>
+            <p:ph type="sldImg"/>
+          </p:nvPr>
+        </p:nvSpPr>
+        <p:spPr/>
+      </p:sp>
+      <p:sp>
+        <p:nvSpPr>
+          <p:cNvPr id="3" name="Notes Placeholder 2"/>
+          <p:cNvSpPr>
+            <a:spLocks noGrp="1"/>
+          </p:cNvSpPr>
+          <p:nvPr>
+            <p:ph type="body" idx="1"/>
+          </p:nvPr>
+        </p:nvSpPr>
+        <p:spPr/>
+        <p:txBody>
+          <a:bodyPr/>
+          <a:lstStyle/>
+          <a:p>
+            <a:endParaRPr lang="en-US" dirty="0"/>
+          </a:p>
+        </p:txBody>
+      </p:sp>
+      <p:sp>
+        <p:nvSpPr>
+          <p:cNvPr id="4" name="Slide Number Placeholder 3"/>
+          <p:cNvSpPr>
+            <a:spLocks noGrp="1"/>
+          </p:cNvSpPr>
+          <p:nvPr>
+            <p:ph type="sldNum" sz="quarter" idx="10"/>
+          </p:nvPr>
+        </p:nvSpPr>
+        <p:spPr/>
+        <p:txBody>
+          <a:bodyPr/>
+          <a:lstStyle/>
+          <a:p>
+            <a:fld id="{0998D5BB-B127-481F-BC0A-2F77C576BB34}" type="slidenum">
+              <a:rPr lang="en-US" smtClean="0"/>
+              <a:t>32</a:t>
+            </a:fld>
+            <a:endParaRPr lang="en-US" dirty="0"/>
+          </a:p>
+        </p:txBody>
+      </p:sp>
+    </p:spTree>
+    <p:extLst>
+      <p:ext uri="{BB962C8B-B14F-4D97-AF65-F5344CB8AC3E}">
         <p14:creationId xmlns:p14="http://schemas.microsoft.com/office/powerpoint/2010/main" val="2007135944"/>
       </p:ext>
     </p:extLst>
@@ -2823,7 +2908,7 @@
 </p:notes>
 </file>
 
-<file path=ppt/notesSlides/notesSlide32.xml><?xml version="1.0" encoding="utf-8"?>
+<file path=ppt/notesSlides/notesSlide33.xml><?xml version="1.0" encoding="utf-8"?>
 <p:notes xmlns:a="http://schemas.openxmlformats.org/drawingml/2006/main" xmlns:r="http://schemas.openxmlformats.org/officeDocument/2006/relationships" xmlns:p="http://schemas.openxmlformats.org/presentationml/2006/main">
   <p:cSld>
     <p:spTree>
@@ -2930,7 +3015,7 @@
                   <a:prstClr val="black"/>
                 </a:solidFill>
               </a:rPr>
-              <a:t>10/20/21 12:54 PM</a:t>
+              <a:t>11/10/21 9:54 AM</a:t>
             </a:fld>
             <a:endParaRPr lang="en-US" dirty="0">
               <a:solidFill>
@@ -2962,7 +3047,7 @@
                 </a:solidFill>
               </a:rPr>
               <a:pPr/>
-              <a:t>32</a:t>
+              <a:t>33</a:t>
             </a:fld>
             <a:endParaRPr lang="en-US" dirty="0">
               <a:solidFill>
@@ -20296,7 +20381,7 @@
                   <a:schemeClr val="tx1"/>
                 </a:solidFill>
               </a:rPr>
-              <a:t>Can they really expect a non-data scientist to create performant models using automated machine learning?</a:t>
+              <a:t>Can they really expect to create performant models using automated machine learning?</a:t>
             </a:r>
             <a:endParaRPr lang="en-US" sz="2000" dirty="0">
               <a:solidFill>
@@ -20840,7 +20925,7 @@
                   <a:schemeClr val="tx1"/>
                 </a:solidFill>
               </a:rPr>
-              <a:t>Pseudo code on how to use the Text Analytics Python APIs for their text analytics use cases</a:t>
+              <a:t>Pseudo code on how to use the Text Analytics Python APIs for their text analytics use cases (The actual solution may use the Python SDK or REST APIs)</a:t>
             </a:r>
             <a:br>
               <a:rPr lang="en-US" sz="2400" dirty="0">
@@ -20862,381 +20947,104 @@
               <a:buNone/>
             </a:pPr>
             <a:r>
-              <a:rPr lang="en-US" sz="1800" dirty="0">
+              <a:rPr lang="en-US" sz="2400" dirty="0">
                 <a:solidFill>
                   <a:schemeClr val="tx1"/>
                 </a:solidFill>
                 <a:latin typeface="+mn-lt"/>
               </a:rPr>
-              <a:t>from </a:t>
-            </a:r>
-            <a:r>
-              <a:rPr lang="en-US" sz="1800" dirty="0" err="1">
+              <a:t>The steps required to use the Text Analytics APIs is as follows:</a:t>
+            </a:r>
+          </a:p>
+          <a:p>
+            <a:pPr marL="457200" indent="-457200">
+              <a:buFont typeface="+mj-lt"/>
+              <a:buAutoNum type="arabicPeriod"/>
+            </a:pPr>
+            <a:r>
+              <a:rPr lang="en-US" sz="2400" dirty="0">
                 <a:solidFill>
                   <a:schemeClr val="tx1"/>
                 </a:solidFill>
                 <a:latin typeface="+mn-lt"/>
               </a:rPr>
-              <a:t>azure.core.credentials</a:t>
-            </a:r>
-            <a:r>
-              <a:rPr lang="en-US" sz="1800" dirty="0">
+              <a:t>Import the dependent libraries</a:t>
+            </a:r>
+          </a:p>
+          <a:p>
+            <a:pPr marL="457200" indent="-457200">
+              <a:buFont typeface="+mj-lt"/>
+              <a:buAutoNum type="arabicPeriod"/>
+            </a:pPr>
+            <a:r>
+              <a:rPr lang="en-US" sz="2400" dirty="0">
                 <a:solidFill>
                   <a:schemeClr val="tx1"/>
                 </a:solidFill>
                 <a:latin typeface="+mn-lt"/>
               </a:rPr>
-              <a:t> import </a:t>
-            </a:r>
-            <a:r>
-              <a:rPr lang="en-US" sz="1800" dirty="0" err="1">
+              <a:t>Create a "client" in the code to interact with the web service</a:t>
+            </a:r>
+          </a:p>
+          <a:p>
+            <a:pPr marL="457200" indent="-457200">
+              <a:buFont typeface="+mj-lt"/>
+              <a:buAutoNum type="arabicPeriod"/>
+            </a:pPr>
+            <a:r>
+              <a:rPr lang="en-US" sz="2400" dirty="0">
                 <a:solidFill>
                   <a:schemeClr val="tx1"/>
                 </a:solidFill>
                 <a:latin typeface="+mn-lt"/>
               </a:rPr>
-              <a:t>AzureKeyCredential</a:t>
-            </a:r>
-            <a:endParaRPr lang="en-US" sz="1800" dirty="0">
-              <a:solidFill>
-                <a:schemeClr val="tx1"/>
-              </a:solidFill>
-              <a:latin typeface="+mn-lt"/>
-            </a:endParaRPr>
-          </a:p>
-          <a:p>
-            <a:pPr marL="0" indent="0">
-              <a:buNone/>
+              <a:t>Read in the claim(s)</a:t>
+            </a:r>
+          </a:p>
+          <a:p>
+            <a:pPr marL="457200" indent="-457200">
+              <a:buFont typeface="+mj-lt"/>
+              <a:buAutoNum type="arabicPeriod"/>
             </a:pPr>
             <a:r>
-              <a:rPr lang="en-US" sz="1800" dirty="0">
+              <a:rPr lang="en-US" sz="2400" dirty="0">
                 <a:solidFill>
                   <a:schemeClr val="tx1"/>
                 </a:solidFill>
                 <a:latin typeface="+mn-lt"/>
               </a:rPr>
-              <a:t>from </a:t>
-            </a:r>
-            <a:r>
-              <a:rPr lang="en-US" sz="1800" dirty="0" err="1">
+              <a:t>Send the claim text to the Text Analytics API to retrieve the information specifically needed (i.e. sentiments, extract key phrases, etc.)</a:t>
+            </a:r>
+          </a:p>
+          <a:p>
+            <a:pPr marL="457200" indent="-457200">
+              <a:buFont typeface="+mj-lt"/>
+              <a:buAutoNum type="arabicPeriod"/>
+            </a:pPr>
+            <a:r>
+              <a:rPr lang="en-US" sz="2400" dirty="0">
                 <a:solidFill>
                   <a:schemeClr val="tx1"/>
                 </a:solidFill>
                 <a:latin typeface="+mn-lt"/>
               </a:rPr>
-              <a:t>azure.ai.textanalytics</a:t>
-            </a:r>
-            <a:r>
-              <a:rPr lang="en-US" sz="1800" dirty="0">
+              <a:t>Retrieve the results</a:t>
+            </a:r>
+          </a:p>
+          <a:p>
+            <a:pPr marL="457200" indent="-457200">
+              <a:buFont typeface="+mj-lt"/>
+              <a:buAutoNum type="arabicPeriod"/>
+            </a:pPr>
+            <a:r>
+              <a:rPr lang="en-US" sz="2400" dirty="0">
                 <a:solidFill>
                   <a:schemeClr val="tx1"/>
                 </a:solidFill>
                 <a:latin typeface="+mn-lt"/>
               </a:rPr>
-              <a:t> import </a:t>
-            </a:r>
-            <a:r>
-              <a:rPr lang="en-US" sz="1800" dirty="0" err="1">
-                <a:solidFill>
-                  <a:schemeClr val="tx1"/>
-                </a:solidFill>
-                <a:latin typeface="+mn-lt"/>
-              </a:rPr>
-              <a:t>TextAnalyticsClient</a:t>
-            </a:r>
-            <a:endParaRPr lang="en-US" sz="1800" dirty="0">
-              <a:solidFill>
-                <a:schemeClr val="tx1"/>
-              </a:solidFill>
-              <a:latin typeface="+mn-lt"/>
-            </a:endParaRPr>
-          </a:p>
-          <a:p>
-            <a:pPr marL="0" indent="0">
-              <a:buNone/>
-            </a:pPr>
-            <a:r>
-              <a:rPr lang="en-US" sz="1800" dirty="0">
-                <a:solidFill>
-                  <a:schemeClr val="tx1"/>
-                </a:solidFill>
-                <a:latin typeface="+mn-lt"/>
-              </a:rPr>
-              <a:t># Create the Text Analytics Client</a:t>
-            </a:r>
-          </a:p>
-          <a:p>
-            <a:pPr marL="0" indent="0">
-              <a:buNone/>
-            </a:pPr>
-            <a:r>
-              <a:rPr lang="en-US" sz="1800" dirty="0">
-                <a:solidFill>
-                  <a:schemeClr val="tx1"/>
-                </a:solidFill>
-                <a:latin typeface="+mn-lt"/>
-              </a:rPr>
-              <a:t>credential = </a:t>
-            </a:r>
-            <a:r>
-              <a:rPr lang="en-US" sz="1800" dirty="0" err="1">
-                <a:solidFill>
-                  <a:schemeClr val="tx1"/>
-                </a:solidFill>
-                <a:latin typeface="+mn-lt"/>
-              </a:rPr>
-              <a:t>AzureKeyCredential</a:t>
-            </a:r>
-            <a:r>
-              <a:rPr lang="en-US" sz="1800" dirty="0">
-                <a:solidFill>
-                  <a:schemeClr val="tx1"/>
-                </a:solidFill>
-                <a:latin typeface="+mn-lt"/>
-              </a:rPr>
-              <a:t>(key)</a:t>
-            </a:r>
-          </a:p>
-          <a:p>
-            <a:pPr marL="0" indent="0">
-              <a:buNone/>
-            </a:pPr>
-            <a:r>
-              <a:rPr lang="en-US" sz="1800" dirty="0">
-                <a:solidFill>
-                  <a:schemeClr val="tx1"/>
-                </a:solidFill>
-                <a:latin typeface="+mn-lt"/>
-              </a:rPr>
-              <a:t>client = </a:t>
-            </a:r>
-            <a:r>
-              <a:rPr lang="en-US" sz="1800" dirty="0" err="1">
-                <a:solidFill>
-                  <a:schemeClr val="tx1"/>
-                </a:solidFill>
-                <a:latin typeface="+mn-lt"/>
-              </a:rPr>
-              <a:t>TextAnalyticsClient</a:t>
-            </a:r>
-            <a:r>
-              <a:rPr lang="en-US" sz="1800" dirty="0">
-                <a:solidFill>
-                  <a:schemeClr val="tx1"/>
-                </a:solidFill>
-                <a:latin typeface="+mn-lt"/>
-              </a:rPr>
-              <a:t>(endpoint=endpoint, credential=credential)</a:t>
-            </a:r>
-          </a:p>
-          <a:p>
-            <a:pPr marL="0" indent="0">
-              <a:buNone/>
-            </a:pPr>
-            <a:r>
-              <a:rPr lang="en-US" sz="1800" dirty="0">
-                <a:solidFill>
-                  <a:schemeClr val="tx1"/>
-                </a:solidFill>
-                <a:latin typeface="+mn-lt"/>
-              </a:rPr>
-              <a:t> # Analyze sentiments in the claims text</a:t>
-            </a:r>
-          </a:p>
-          <a:p>
-            <a:pPr marL="0" indent="0">
-              <a:buNone/>
-            </a:pPr>
-            <a:r>
-              <a:rPr lang="en-US" sz="1800" dirty="0">
-                <a:solidFill>
-                  <a:schemeClr val="tx1"/>
-                </a:solidFill>
-                <a:latin typeface="+mn-lt"/>
-              </a:rPr>
-              <a:t>claim = "..."</a:t>
-            </a:r>
-          </a:p>
-          <a:p>
-            <a:pPr marL="0" indent="0">
-              <a:buNone/>
-            </a:pPr>
-            <a:r>
-              <a:rPr lang="en-US" sz="1800" dirty="0">
-                <a:solidFill>
-                  <a:schemeClr val="tx1"/>
-                </a:solidFill>
-                <a:latin typeface="+mn-lt"/>
-              </a:rPr>
-              <a:t>response = </a:t>
-            </a:r>
-            <a:r>
-              <a:rPr lang="en-US" sz="1800" dirty="0" err="1">
-                <a:solidFill>
-                  <a:schemeClr val="tx1"/>
-                </a:solidFill>
-                <a:latin typeface="+mn-lt"/>
-              </a:rPr>
-              <a:t>client.analyze_sentiment</a:t>
-            </a:r>
-            <a:r>
-              <a:rPr lang="en-US" sz="1800" dirty="0">
-                <a:solidFill>
-                  <a:schemeClr val="tx1"/>
-                </a:solidFill>
-                <a:latin typeface="+mn-lt"/>
-              </a:rPr>
-              <a:t>(documents=[claim])[0]</a:t>
-            </a:r>
-          </a:p>
-          <a:p>
-            <a:pPr marL="0" indent="0">
-              <a:buNone/>
-            </a:pPr>
-            <a:r>
-              <a:rPr lang="en-US" sz="1800" dirty="0">
-                <a:solidFill>
-                  <a:schemeClr val="tx1"/>
-                </a:solidFill>
-                <a:latin typeface="+mn-lt"/>
-              </a:rPr>
-              <a:t># Retrieve the sentiment scores from the response</a:t>
-            </a:r>
-          </a:p>
-          <a:p>
-            <a:pPr marL="0" indent="0">
-              <a:buNone/>
-            </a:pPr>
-            <a:r>
-              <a:rPr lang="en-US" sz="1800" dirty="0" err="1">
-                <a:solidFill>
-                  <a:schemeClr val="tx1"/>
-                </a:solidFill>
-                <a:latin typeface="+mn-lt"/>
-              </a:rPr>
-              <a:t>overall_positive_score</a:t>
-            </a:r>
-            <a:r>
-              <a:rPr lang="en-US" sz="1800" dirty="0">
-                <a:solidFill>
-                  <a:schemeClr val="tx1"/>
-                </a:solidFill>
-                <a:latin typeface="+mn-lt"/>
-              </a:rPr>
-              <a:t> = </a:t>
-            </a:r>
-            <a:r>
-              <a:rPr lang="en-US" sz="1800" dirty="0" err="1">
-                <a:solidFill>
-                  <a:schemeClr val="tx1"/>
-                </a:solidFill>
-                <a:latin typeface="+mn-lt"/>
-              </a:rPr>
-              <a:t>response.confidence_scores.positive</a:t>
-            </a:r>
-            <a:endParaRPr lang="en-US" sz="1800" dirty="0">
-              <a:solidFill>
-                <a:schemeClr val="tx1"/>
-              </a:solidFill>
-              <a:latin typeface="+mn-lt"/>
-            </a:endParaRPr>
-          </a:p>
-          <a:p>
-            <a:pPr marL="0" indent="0">
-              <a:buNone/>
-            </a:pPr>
-            <a:r>
-              <a:rPr lang="en-US" sz="1800" dirty="0" err="1">
-                <a:solidFill>
-                  <a:schemeClr val="tx1"/>
-                </a:solidFill>
-                <a:latin typeface="+mn-lt"/>
-              </a:rPr>
-              <a:t>overall_neutral_score</a:t>
-            </a:r>
-            <a:r>
-              <a:rPr lang="en-US" sz="1800" dirty="0">
-                <a:solidFill>
-                  <a:schemeClr val="tx1"/>
-                </a:solidFill>
-                <a:latin typeface="+mn-lt"/>
-              </a:rPr>
-              <a:t> = </a:t>
-            </a:r>
-            <a:r>
-              <a:rPr lang="en-US" sz="1800" dirty="0" err="1">
-                <a:solidFill>
-                  <a:schemeClr val="tx1"/>
-                </a:solidFill>
-                <a:latin typeface="+mn-lt"/>
-              </a:rPr>
-              <a:t>response.confidence_scores.neutral</a:t>
-            </a:r>
-            <a:endParaRPr lang="en-US" sz="1800" dirty="0">
-              <a:solidFill>
-                <a:schemeClr val="tx1"/>
-              </a:solidFill>
-              <a:latin typeface="+mn-lt"/>
-            </a:endParaRPr>
-          </a:p>
-          <a:p>
-            <a:pPr marL="0" indent="0">
-              <a:buNone/>
-            </a:pPr>
-            <a:r>
-              <a:rPr lang="en-US" sz="1800" dirty="0" err="1">
-                <a:solidFill>
-                  <a:schemeClr val="tx1"/>
-                </a:solidFill>
-                <a:latin typeface="+mn-lt"/>
-              </a:rPr>
-              <a:t>overall_negative_score</a:t>
-            </a:r>
-            <a:r>
-              <a:rPr lang="en-US" sz="1800" dirty="0">
-                <a:solidFill>
-                  <a:schemeClr val="tx1"/>
-                </a:solidFill>
-                <a:latin typeface="+mn-lt"/>
-              </a:rPr>
-              <a:t> = </a:t>
-            </a:r>
-            <a:r>
-              <a:rPr lang="en-US" sz="1800" dirty="0" err="1">
-                <a:solidFill>
-                  <a:schemeClr val="tx1"/>
-                </a:solidFill>
-                <a:latin typeface="+mn-lt"/>
-              </a:rPr>
-              <a:t>response.confidence_scores.negative</a:t>
-            </a:r>
-            <a:endParaRPr lang="en-US" sz="2400" dirty="0">
-              <a:solidFill>
-                <a:schemeClr val="tx1"/>
-              </a:solidFill>
-              <a:latin typeface="+mn-lt"/>
-            </a:endParaRPr>
-          </a:p>
-          <a:p>
-            <a:pPr marL="0" indent="0">
-              <a:spcAft>
-                <a:spcPts val="882"/>
-              </a:spcAft>
-              <a:buNone/>
-            </a:pPr>
-            <a:endParaRPr lang="en-US" sz="1800" dirty="0">
-              <a:solidFill>
-                <a:schemeClr val="tx1"/>
-              </a:solidFill>
-            </a:endParaRPr>
-          </a:p>
-          <a:p>
-            <a:pPr marL="0" indent="0">
-              <a:spcAft>
-                <a:spcPts val="882"/>
-              </a:spcAft>
-              <a:buNone/>
-            </a:pPr>
+              <a:t>Parse the returned values and send them to the next step of the solution chain</a:t>
+            </a:r>
             <a:endParaRPr lang="en-US" sz="1800" dirty="0">
               <a:solidFill>
                 <a:schemeClr val="tx1"/>
@@ -21301,6 +21109,579 @@
           <a:lstStyle/>
           <a:p>
             <a:r>
+              <a:rPr lang="en-US" sz="4900" dirty="0">
+                <a:solidFill>
+                  <a:schemeClr val="tx1"/>
+                </a:solidFill>
+              </a:rPr>
+              <a:t>Preferred solution</a:t>
+            </a:r>
+            <a:endParaRPr lang="en-US" sz="3236" dirty="0">
+              <a:solidFill>
+                <a:schemeClr val="tx1"/>
+              </a:solidFill>
+              <a:latin typeface="Segoe UI" panose="020B0502040204020203" pitchFamily="34" charset="0"/>
+            </a:endParaRPr>
+          </a:p>
+        </p:txBody>
+      </p:sp>
+      <p:sp>
+        <p:nvSpPr>
+          <p:cNvPr id="4" name="Title 1"/>
+          <p:cNvSpPr txBox="1">
+            <a:spLocks/>
+          </p:cNvSpPr>
+          <p:nvPr/>
+        </p:nvSpPr>
+        <p:spPr>
+          <a:xfrm>
+            <a:off x="269240" y="1073991"/>
+            <a:ext cx="11655840" cy="899665"/>
+          </a:xfrm>
+          <a:prstGeom prst="rect">
+            <a:avLst/>
+          </a:prstGeom>
+        </p:spPr>
+        <p:txBody>
+          <a:bodyPr vert="horz" wrap="square" lIns="146304" tIns="91440" rIns="146304" bIns="91440" rtlCol="0" anchor="t">
+            <a:noAutofit/>
+          </a:bodyPr>
+          <a:lstStyle>
+            <a:lvl1pPr algn="l" defTabSz="914367" rtl="0" eaLnBrk="1" latinLnBrk="0" hangingPunct="1">
+              <a:lnSpc>
+                <a:spcPct val="90000"/>
+              </a:lnSpc>
+              <a:spcBef>
+                <a:spcPct val="0"/>
+              </a:spcBef>
+              <a:buNone/>
+              <a:defRPr lang="en-US" sz="4705" b="0" kern="1200" cap="none" spc="-100" baseline="0" dirty="0" smtClean="0">
+                <a:ln w="3175">
+                  <a:noFill/>
+                </a:ln>
+                <a:gradFill>
+                  <a:gsLst>
+                    <a:gs pos="1250">
+                      <a:schemeClr val="tx1"/>
+                    </a:gs>
+                    <a:gs pos="100000">
+                      <a:schemeClr val="tx1"/>
+                    </a:gs>
+                  </a:gsLst>
+                  <a:lin ang="5400000" scaled="0"/>
+                </a:gradFill>
+                <a:effectLst/>
+                <a:latin typeface="+mj-lt"/>
+                <a:ea typeface="+mn-ea"/>
+                <a:cs typeface="Segoe UI" pitchFamily="34" charset="0"/>
+              </a:defRPr>
+            </a:lvl1pPr>
+          </a:lstStyle>
+          <a:p>
+            <a:r>
+              <a:rPr lang="en-US" sz="3600" dirty="0">
+                <a:solidFill>
+                  <a:schemeClr val="tx1"/>
+                </a:solidFill>
+                <a:latin typeface="+mn-lt"/>
+              </a:rPr>
+              <a:t>Free-text Analytics</a:t>
+            </a:r>
+          </a:p>
+        </p:txBody>
+      </p:sp>
+      <p:sp>
+        <p:nvSpPr>
+          <p:cNvPr id="3" name="Content Placeholder 2"/>
+          <p:cNvSpPr>
+            <a:spLocks noGrp="1"/>
+          </p:cNvSpPr>
+          <p:nvPr>
+            <p:ph type="body" sz="quarter" idx="10"/>
+          </p:nvPr>
+        </p:nvSpPr>
+        <p:spPr>
+          <a:xfrm>
+            <a:off x="269240" y="1689920"/>
+            <a:ext cx="11781246" cy="4878569"/>
+          </a:xfrm>
+        </p:spPr>
+        <p:txBody>
+          <a:bodyPr>
+            <a:noAutofit/>
+          </a:bodyPr>
+          <a:lstStyle/>
+          <a:p>
+            <a:pPr marL="0" indent="0">
+              <a:buNone/>
+            </a:pPr>
+            <a:r>
+              <a:rPr lang="en-US" sz="2400" dirty="0">
+                <a:solidFill>
+                  <a:schemeClr val="tx1"/>
+                </a:solidFill>
+              </a:rPr>
+              <a:t>Pseudo code on how to use the Text Analytics Python APIs for their text analytics use cases (The actual solution may use the Python SDK or REST APIs)</a:t>
+            </a:r>
+            <a:br>
+              <a:rPr lang="en-US" sz="2400" dirty="0">
+                <a:solidFill>
+                  <a:schemeClr val="tx1"/>
+                </a:solidFill>
+                <a:latin typeface="+mn-lt"/>
+              </a:rPr>
+            </a:br>
+            <a:endParaRPr lang="en-US" sz="1800" dirty="0">
+              <a:solidFill>
+                <a:schemeClr val="tx1"/>
+              </a:solidFill>
+              <a:latin typeface="+mn-lt"/>
+            </a:endParaRPr>
+          </a:p>
+          <a:p>
+            <a:pPr marL="0" indent="0">
+              <a:buNone/>
+            </a:pPr>
+            <a:r>
+              <a:rPr lang="en-US" sz="1800" dirty="0">
+                <a:solidFill>
+                  <a:schemeClr val="tx1"/>
+                </a:solidFill>
+                <a:latin typeface="+mn-lt"/>
+              </a:rPr>
+              <a:t>from </a:t>
+            </a:r>
+            <a:r>
+              <a:rPr lang="en-US" sz="1800" dirty="0" err="1">
+                <a:solidFill>
+                  <a:schemeClr val="tx1"/>
+                </a:solidFill>
+                <a:latin typeface="+mn-lt"/>
+              </a:rPr>
+              <a:t>azure.core.credentials</a:t>
+            </a:r>
+            <a:r>
+              <a:rPr lang="en-US" sz="1800" dirty="0">
+                <a:solidFill>
+                  <a:schemeClr val="tx1"/>
+                </a:solidFill>
+                <a:latin typeface="+mn-lt"/>
+              </a:rPr>
+              <a:t> import </a:t>
+            </a:r>
+            <a:r>
+              <a:rPr lang="en-US" sz="1800" dirty="0" err="1">
+                <a:solidFill>
+                  <a:schemeClr val="tx1"/>
+                </a:solidFill>
+                <a:latin typeface="+mn-lt"/>
+              </a:rPr>
+              <a:t>AzureKeyCredential</a:t>
+            </a:r>
+            <a:endParaRPr lang="en-US" sz="1800" dirty="0">
+              <a:solidFill>
+                <a:schemeClr val="tx1"/>
+              </a:solidFill>
+              <a:latin typeface="+mn-lt"/>
+            </a:endParaRPr>
+          </a:p>
+          <a:p>
+            <a:pPr marL="0" indent="0">
+              <a:buNone/>
+            </a:pPr>
+            <a:r>
+              <a:rPr lang="en-US" sz="1800" dirty="0">
+                <a:solidFill>
+                  <a:schemeClr val="tx1"/>
+                </a:solidFill>
+                <a:latin typeface="+mn-lt"/>
+              </a:rPr>
+              <a:t>from </a:t>
+            </a:r>
+            <a:r>
+              <a:rPr lang="en-US" sz="1800" dirty="0" err="1">
+                <a:solidFill>
+                  <a:schemeClr val="tx1"/>
+                </a:solidFill>
+                <a:latin typeface="+mn-lt"/>
+              </a:rPr>
+              <a:t>azure.ai.textanalytics</a:t>
+            </a:r>
+            <a:r>
+              <a:rPr lang="en-US" sz="1800" dirty="0">
+                <a:solidFill>
+                  <a:schemeClr val="tx1"/>
+                </a:solidFill>
+                <a:latin typeface="+mn-lt"/>
+              </a:rPr>
+              <a:t> import </a:t>
+            </a:r>
+            <a:r>
+              <a:rPr lang="en-US" sz="1800" dirty="0" err="1">
+                <a:solidFill>
+                  <a:schemeClr val="tx1"/>
+                </a:solidFill>
+                <a:latin typeface="+mn-lt"/>
+              </a:rPr>
+              <a:t>TextAnalyticsClient</a:t>
+            </a:r>
+            <a:endParaRPr lang="en-US" sz="1800" dirty="0">
+              <a:solidFill>
+                <a:schemeClr val="tx1"/>
+              </a:solidFill>
+              <a:latin typeface="+mn-lt"/>
+            </a:endParaRPr>
+          </a:p>
+          <a:p>
+            <a:pPr marL="0" indent="0">
+              <a:buNone/>
+            </a:pPr>
+            <a:r>
+              <a:rPr lang="en-US" sz="1800" dirty="0">
+                <a:solidFill>
+                  <a:schemeClr val="tx1"/>
+                </a:solidFill>
+                <a:latin typeface="+mn-lt"/>
+              </a:rPr>
+              <a:t># Create the Text Analytics Client</a:t>
+            </a:r>
+          </a:p>
+          <a:p>
+            <a:pPr marL="0" indent="0">
+              <a:buNone/>
+            </a:pPr>
+            <a:r>
+              <a:rPr lang="en-US" sz="1800" dirty="0">
+                <a:solidFill>
+                  <a:schemeClr val="tx1"/>
+                </a:solidFill>
+                <a:latin typeface="+mn-lt"/>
+              </a:rPr>
+              <a:t>credential = </a:t>
+            </a:r>
+            <a:r>
+              <a:rPr lang="en-US" sz="1800" dirty="0" err="1">
+                <a:solidFill>
+                  <a:schemeClr val="tx1"/>
+                </a:solidFill>
+                <a:latin typeface="+mn-lt"/>
+              </a:rPr>
+              <a:t>AzureKeyCredential</a:t>
+            </a:r>
+            <a:r>
+              <a:rPr lang="en-US" sz="1800" dirty="0">
+                <a:solidFill>
+                  <a:schemeClr val="tx1"/>
+                </a:solidFill>
+                <a:latin typeface="+mn-lt"/>
+              </a:rPr>
+              <a:t>(key)</a:t>
+            </a:r>
+          </a:p>
+          <a:p>
+            <a:pPr marL="0" indent="0">
+              <a:buNone/>
+            </a:pPr>
+            <a:r>
+              <a:rPr lang="en-US" sz="1800" dirty="0">
+                <a:solidFill>
+                  <a:schemeClr val="tx1"/>
+                </a:solidFill>
+                <a:latin typeface="+mn-lt"/>
+              </a:rPr>
+              <a:t>client = </a:t>
+            </a:r>
+            <a:r>
+              <a:rPr lang="en-US" sz="1800" dirty="0" err="1">
+                <a:solidFill>
+                  <a:schemeClr val="tx1"/>
+                </a:solidFill>
+                <a:latin typeface="+mn-lt"/>
+              </a:rPr>
+              <a:t>TextAnalyticsClient</a:t>
+            </a:r>
+            <a:r>
+              <a:rPr lang="en-US" sz="1800" dirty="0">
+                <a:solidFill>
+                  <a:schemeClr val="tx1"/>
+                </a:solidFill>
+                <a:latin typeface="+mn-lt"/>
+              </a:rPr>
+              <a:t>(endpoint=endpoint, credential=credential)</a:t>
+            </a:r>
+          </a:p>
+          <a:p>
+            <a:pPr marL="0" indent="0">
+              <a:buNone/>
+            </a:pPr>
+            <a:r>
+              <a:rPr lang="en-US" sz="1800" dirty="0">
+                <a:solidFill>
+                  <a:schemeClr val="tx1"/>
+                </a:solidFill>
+                <a:latin typeface="+mn-lt"/>
+              </a:rPr>
+              <a:t> # Analyze sentiments in the claims text</a:t>
+            </a:r>
+          </a:p>
+          <a:p>
+            <a:pPr marL="0" indent="0">
+              <a:buNone/>
+            </a:pPr>
+            <a:r>
+              <a:rPr lang="en-US" sz="1800" dirty="0">
+                <a:solidFill>
+                  <a:schemeClr val="tx1"/>
+                </a:solidFill>
+                <a:latin typeface="+mn-lt"/>
+              </a:rPr>
+              <a:t>claim = "..."</a:t>
+            </a:r>
+          </a:p>
+          <a:p>
+            <a:pPr marL="0" indent="0">
+              <a:buNone/>
+            </a:pPr>
+            <a:r>
+              <a:rPr lang="en-US" sz="1800" dirty="0">
+                <a:solidFill>
+                  <a:schemeClr val="tx1"/>
+                </a:solidFill>
+                <a:latin typeface="+mn-lt"/>
+              </a:rPr>
+              <a:t>response = </a:t>
+            </a:r>
+            <a:r>
+              <a:rPr lang="en-US" sz="1800" dirty="0" err="1">
+                <a:solidFill>
+                  <a:schemeClr val="tx1"/>
+                </a:solidFill>
+                <a:latin typeface="+mn-lt"/>
+              </a:rPr>
+              <a:t>client.analyze_sentiment</a:t>
+            </a:r>
+            <a:r>
+              <a:rPr lang="en-US" sz="1800" dirty="0">
+                <a:solidFill>
+                  <a:schemeClr val="tx1"/>
+                </a:solidFill>
+                <a:latin typeface="+mn-lt"/>
+              </a:rPr>
+              <a:t>(documents=[claim])[0]</a:t>
+            </a:r>
+          </a:p>
+          <a:p>
+            <a:pPr marL="0" indent="0">
+              <a:buNone/>
+            </a:pPr>
+            <a:r>
+              <a:rPr lang="en-US" sz="1800" dirty="0">
+                <a:solidFill>
+                  <a:schemeClr val="tx1"/>
+                </a:solidFill>
+                <a:latin typeface="+mn-lt"/>
+              </a:rPr>
+              <a:t># Retrieve the sentiment scores from the response</a:t>
+            </a:r>
+          </a:p>
+          <a:p>
+            <a:pPr marL="0" indent="0">
+              <a:buNone/>
+            </a:pPr>
+            <a:r>
+              <a:rPr lang="en-US" sz="1800" dirty="0" err="1">
+                <a:solidFill>
+                  <a:schemeClr val="tx1"/>
+                </a:solidFill>
+                <a:latin typeface="+mn-lt"/>
+              </a:rPr>
+              <a:t>overall_positive_score</a:t>
+            </a:r>
+            <a:r>
+              <a:rPr lang="en-US" sz="1800" dirty="0">
+                <a:solidFill>
+                  <a:schemeClr val="tx1"/>
+                </a:solidFill>
+                <a:latin typeface="+mn-lt"/>
+              </a:rPr>
+              <a:t> = </a:t>
+            </a:r>
+            <a:r>
+              <a:rPr lang="en-US" sz="1800" dirty="0" err="1">
+                <a:solidFill>
+                  <a:schemeClr val="tx1"/>
+                </a:solidFill>
+                <a:latin typeface="+mn-lt"/>
+              </a:rPr>
+              <a:t>response.confidence_scores.positive</a:t>
+            </a:r>
+            <a:endParaRPr lang="en-US" sz="1800" dirty="0">
+              <a:solidFill>
+                <a:schemeClr val="tx1"/>
+              </a:solidFill>
+              <a:latin typeface="+mn-lt"/>
+            </a:endParaRPr>
+          </a:p>
+          <a:p>
+            <a:pPr marL="0" indent="0">
+              <a:buNone/>
+            </a:pPr>
+            <a:r>
+              <a:rPr lang="en-US" sz="1800" dirty="0" err="1">
+                <a:solidFill>
+                  <a:schemeClr val="tx1"/>
+                </a:solidFill>
+                <a:latin typeface="+mn-lt"/>
+              </a:rPr>
+              <a:t>overall_neutral_score</a:t>
+            </a:r>
+            <a:r>
+              <a:rPr lang="en-US" sz="1800" dirty="0">
+                <a:solidFill>
+                  <a:schemeClr val="tx1"/>
+                </a:solidFill>
+                <a:latin typeface="+mn-lt"/>
+              </a:rPr>
+              <a:t> = </a:t>
+            </a:r>
+            <a:r>
+              <a:rPr lang="en-US" sz="1800" dirty="0" err="1">
+                <a:solidFill>
+                  <a:schemeClr val="tx1"/>
+                </a:solidFill>
+                <a:latin typeface="+mn-lt"/>
+              </a:rPr>
+              <a:t>response.confidence_scores.neutral</a:t>
+            </a:r>
+            <a:endParaRPr lang="en-US" sz="1800" dirty="0">
+              <a:solidFill>
+                <a:schemeClr val="tx1"/>
+              </a:solidFill>
+              <a:latin typeface="+mn-lt"/>
+            </a:endParaRPr>
+          </a:p>
+          <a:p>
+            <a:pPr marL="0" indent="0">
+              <a:buNone/>
+            </a:pPr>
+            <a:r>
+              <a:rPr lang="en-US" sz="1800" dirty="0" err="1">
+                <a:solidFill>
+                  <a:schemeClr val="tx1"/>
+                </a:solidFill>
+                <a:latin typeface="+mn-lt"/>
+              </a:rPr>
+              <a:t>overall_negative_score</a:t>
+            </a:r>
+            <a:r>
+              <a:rPr lang="en-US" sz="1800" dirty="0">
+                <a:solidFill>
+                  <a:schemeClr val="tx1"/>
+                </a:solidFill>
+                <a:latin typeface="+mn-lt"/>
+              </a:rPr>
+              <a:t> = </a:t>
+            </a:r>
+            <a:r>
+              <a:rPr lang="en-US" sz="1800" dirty="0" err="1">
+                <a:solidFill>
+                  <a:schemeClr val="tx1"/>
+                </a:solidFill>
+                <a:latin typeface="+mn-lt"/>
+              </a:rPr>
+              <a:t>response.confidence_scores.negative</a:t>
+            </a:r>
+            <a:endParaRPr lang="en-US" sz="2400" dirty="0">
+              <a:solidFill>
+                <a:schemeClr val="tx1"/>
+              </a:solidFill>
+              <a:latin typeface="+mn-lt"/>
+            </a:endParaRPr>
+          </a:p>
+          <a:p>
+            <a:pPr marL="0" indent="0">
+              <a:spcAft>
+                <a:spcPts val="882"/>
+              </a:spcAft>
+              <a:buNone/>
+            </a:pPr>
+            <a:endParaRPr lang="en-US" sz="1800" dirty="0">
+              <a:solidFill>
+                <a:schemeClr val="tx1"/>
+              </a:solidFill>
+            </a:endParaRPr>
+          </a:p>
+          <a:p>
+            <a:pPr marL="0" indent="0">
+              <a:spcAft>
+                <a:spcPts val="882"/>
+              </a:spcAft>
+              <a:buNone/>
+            </a:pPr>
+            <a:endParaRPr lang="en-US" sz="1800" dirty="0">
+              <a:solidFill>
+                <a:schemeClr val="tx1"/>
+              </a:solidFill>
+            </a:endParaRPr>
+          </a:p>
+        </p:txBody>
+      </p:sp>
+    </p:spTree>
+    <p:extLst>
+      <p:ext uri="{BB962C8B-B14F-4D97-AF65-F5344CB8AC3E}">
+        <p14:creationId xmlns:p14="http://schemas.microsoft.com/office/powerpoint/2010/main" val="500176663"/>
+      </p:ext>
+    </p:extLst>
+  </p:cSld>
+  <p:clrMapOvr>
+    <a:masterClrMapping/>
+  </p:clrMapOvr>
+  <mc:AlternateContent xmlns:mc="http://schemas.openxmlformats.org/markup-compatibility/2006" xmlns:p14="http://schemas.microsoft.com/office/powerpoint/2010/main">
+    <mc:Choice Requires="p14">
+      <p:transition p14:dur="0"/>
+    </mc:Choice>
+    <mc:Fallback xmlns="">
+      <p:transition/>
+    </mc:Fallback>
+  </mc:AlternateContent>
+</p:sld>
+</file>
+
+<file path=ppt/slides/slide28.xml><?xml version="1.0" encoding="utf-8"?>
+<p:sld xmlns:a="http://schemas.openxmlformats.org/drawingml/2006/main" xmlns:r="http://schemas.openxmlformats.org/officeDocument/2006/relationships" xmlns:p="http://schemas.openxmlformats.org/presentationml/2006/main">
+  <p:cSld>
+    <p:spTree>
+      <p:nvGrpSpPr>
+        <p:cNvPr id="1" name=""/>
+        <p:cNvGrpSpPr/>
+        <p:nvPr/>
+      </p:nvGrpSpPr>
+      <p:grpSpPr>
+        <a:xfrm>
+          <a:off x="0" y="0"/>
+          <a:ext cx="0" cy="0"/>
+          <a:chOff x="0" y="0"/>
+          <a:chExt cx="0" cy="0"/>
+        </a:xfrm>
+      </p:grpSpPr>
+      <p:sp>
+        <p:nvSpPr>
+          <p:cNvPr id="2" name="Title 1"/>
+          <p:cNvSpPr>
+            <a:spLocks noGrp="1"/>
+          </p:cNvSpPr>
+          <p:nvPr>
+            <p:ph type="title"/>
+          </p:nvPr>
+        </p:nvSpPr>
+        <p:spPr/>
+        <p:txBody>
+          <a:bodyPr>
+            <a:normAutofit/>
+          </a:bodyPr>
+          <a:lstStyle/>
+          <a:p>
+            <a:r>
               <a:rPr lang="en-US" sz="4400" dirty="0">
                 <a:solidFill>
                   <a:schemeClr val="tx1"/>
@@ -21465,7 +21846,7 @@
                 </a:solidFill>
                 <a:latin typeface="+mn-lt"/>
               </a:rPr>
-              <a:t>The extractive summarization is a feature in Azure Text Analytics produces a summary by extracting sentences that collectively represent the most important or relevant information within the original content. It is currently in preview capability and once it’s becomes GA it can be leveraged in a similar fashion as the other Text Analytics APIs</a:t>
+              <a:t>The extractive summarization is a feature in Azure Text Analytics produces a summary by extracting sentences that collectively represent the most important or relevant information within the original content. Text Analytics extractive summarization is a preview capability (as of Nov 2021) and once it’s becomes GA it can be leveraged in a similar fashion as the other Text Analytics APIs</a:t>
             </a:r>
           </a:p>
           <a:p>
@@ -21500,158 +21881,6 @@
     <p:extLst>
       <p:ext uri="{BB962C8B-B14F-4D97-AF65-F5344CB8AC3E}">
         <p14:creationId xmlns:p14="http://schemas.microsoft.com/office/powerpoint/2010/main" val="3128972092"/>
-      </p:ext>
-    </p:extLst>
-  </p:cSld>
-  <p:clrMapOvr>
-    <a:masterClrMapping/>
-  </p:clrMapOvr>
-  <mc:AlternateContent xmlns:mc="http://schemas.openxmlformats.org/markup-compatibility/2006" xmlns:p14="http://schemas.microsoft.com/office/powerpoint/2010/main">
-    <mc:Choice Requires="p14">
-      <p:transition p14:dur="0"/>
-    </mc:Choice>
-    <mc:Fallback xmlns="">
-      <p:transition/>
-    </mc:Fallback>
-  </mc:AlternateContent>
-</p:sld>
-</file>
-
-<file path=ppt/slides/slide28.xml><?xml version="1.0" encoding="utf-8"?>
-<p:sld xmlns:a="http://schemas.openxmlformats.org/drawingml/2006/main" xmlns:r="http://schemas.openxmlformats.org/officeDocument/2006/relationships" xmlns:p="http://schemas.openxmlformats.org/presentationml/2006/main">
-  <p:cSld>
-    <p:spTree>
-      <p:nvGrpSpPr>
-        <p:cNvPr id="1" name=""/>
-        <p:cNvGrpSpPr/>
-        <p:nvPr/>
-      </p:nvGrpSpPr>
-      <p:grpSpPr>
-        <a:xfrm>
-          <a:off x="0" y="0"/>
-          <a:ext cx="0" cy="0"/>
-          <a:chOff x="0" y="0"/>
-          <a:chExt cx="0" cy="0"/>
-        </a:xfrm>
-      </p:grpSpPr>
-      <p:sp>
-        <p:nvSpPr>
-          <p:cNvPr id="2" name="Title 1"/>
-          <p:cNvSpPr>
-            <a:spLocks noGrp="1"/>
-          </p:cNvSpPr>
-          <p:nvPr>
-            <p:ph type="title"/>
-          </p:nvPr>
-        </p:nvSpPr>
-        <p:spPr/>
-        <p:txBody>
-          <a:bodyPr>
-            <a:normAutofit fontScale="90000"/>
-          </a:bodyPr>
-          <a:lstStyle/>
-          <a:p>
-            <a:r>
-              <a:rPr lang="en-US" sz="4900" dirty="0">
-                <a:solidFill>
-                  <a:schemeClr val="tx1"/>
-                </a:solidFill>
-                <a:cs typeface="Segoe UI" panose="020B0502040204020203" pitchFamily="34" charset="0"/>
-              </a:rPr>
-              <a:t>Preferred objections handling</a:t>
-            </a:r>
-            <a:br>
-              <a:rPr lang="en-US" dirty="0">
-                <a:solidFill>
-                  <a:schemeClr val="tx1"/>
-                </a:solidFill>
-                <a:latin typeface="Segoe UI" panose="020B0502040204020203" pitchFamily="34" charset="0"/>
-              </a:rPr>
-            </a:br>
-            <a:endParaRPr lang="en-US" sz="3236" dirty="0">
-              <a:solidFill>
-                <a:schemeClr val="tx1"/>
-              </a:solidFill>
-              <a:latin typeface="Segoe UI" panose="020B0502040204020203" pitchFamily="34" charset="0"/>
-            </a:endParaRPr>
-          </a:p>
-        </p:txBody>
-      </p:sp>
-      <p:sp>
-        <p:nvSpPr>
-          <p:cNvPr id="3" name="Content Placeholder 2"/>
-          <p:cNvSpPr>
-            <a:spLocks noGrp="1"/>
-          </p:cNvSpPr>
-          <p:nvPr>
-            <p:ph type="body" sz="quarter" idx="10"/>
-          </p:nvPr>
-        </p:nvSpPr>
-        <p:spPr>
-          <a:xfrm>
-            <a:off x="269240" y="1189176"/>
-            <a:ext cx="11215190" cy="5179873"/>
-          </a:xfrm>
-        </p:spPr>
-        <p:txBody>
-          <a:bodyPr>
-            <a:noAutofit/>
-          </a:bodyPr>
-          <a:lstStyle/>
-          <a:p>
-            <a:pPr marL="0" indent="0">
-              <a:spcAft>
-                <a:spcPts val="882"/>
-              </a:spcAft>
-              <a:buNone/>
-            </a:pPr>
-            <a:r>
-              <a:rPr lang="en-US" sz="2800" dirty="0">
-                <a:solidFill>
-                  <a:schemeClr val="tx1"/>
-                </a:solidFill>
-              </a:rPr>
-              <a:t>We are skeptical about all the hype surrounding these "AI" solutions. It's hard to know what is feasible versus what is not possible with today's technology and Azure.</a:t>
-            </a:r>
-          </a:p>
-          <a:p>
-            <a:pPr>
-              <a:spcAft>
-                <a:spcPts val="882"/>
-              </a:spcAft>
-            </a:pPr>
-            <a:r>
-              <a:rPr lang="en-US" sz="2400" dirty="0">
-                <a:solidFill>
-                  <a:schemeClr val="tx1"/>
-                </a:solidFill>
-                <a:latin typeface="+mn-lt"/>
-              </a:rPr>
-              <a:t>While it is true there is a lot of hype around AI, the ability to deploy solutions that use data, machine learning, and deep learning to create an application with “AI” capabilities is real and is possible in Azure.</a:t>
-            </a:r>
-          </a:p>
-          <a:p>
-            <a:pPr>
-              <a:spcAft>
-                <a:spcPts val="882"/>
-              </a:spcAft>
-            </a:pPr>
-            <a:r>
-              <a:rPr lang="en-US" sz="2400" dirty="0">
-                <a:solidFill>
-                  <a:schemeClr val="tx1"/>
-                </a:solidFill>
-                <a:latin typeface="+mn-lt"/>
-              </a:rPr>
-              <a:t>Azure provides a wide range of services to address the needs of AI, from pre-built AI capabilities in Cognitive Services to services that help you to build, train, and deploy your custom AI capabilities using the Azure Machine Learning service and other services from the Microsoft AI stack.</a:t>
-            </a:r>
-          </a:p>
-        </p:txBody>
-      </p:sp>
-    </p:spTree>
-    <p:extLst>
-      <p:ext uri="{BB962C8B-B14F-4D97-AF65-F5344CB8AC3E}">
-        <p14:creationId xmlns:p14="http://schemas.microsoft.com/office/powerpoint/2010/main" val="1491462391"/>
       </p:ext>
     </p:extLst>
   </p:cSld>
@@ -21742,7 +21971,7 @@
         <p:spPr>
           <a:xfrm>
             <a:off x="269240" y="1189176"/>
-            <a:ext cx="10649132" cy="5179873"/>
+            <a:ext cx="11215190" cy="5179873"/>
           </a:xfrm>
         </p:spPr>
         <p:txBody>
@@ -21763,7 +21992,7 @@
                   <a:schemeClr val="tx1"/>
                 </a:solidFill>
               </a:rPr>
-              <a:t>We know that there are both pre-built AI and custom AI options. We are confused as to when to choose one over the other. </a:t>
+              <a:t>We are skeptical about all the hype surrounding these "AI" solutions. It's hard to know what is feasible versus what is not possible with today's technology and Azure.</a:t>
             </a:r>
           </a:p>
           <a:p>
@@ -21779,7 +22008,7 @@
                 </a:solidFill>
                 <a:latin typeface="+mn-lt"/>
               </a:rPr>
-              <a:t>It would be best if you considered the pre-built AI and Automated Machine Learning options first. However, if you rule them out because they do not fit your requirements, you should explore the custom AI options.</a:t>
+              <a:t>While it is true there is a lot of hype around AI, the ability to deploy solutions that use data, machine learning, and deep learning to create an application with “AI” capabilities is real and is possible in Azure.</a:t>
             </a:r>
           </a:p>
           <a:p>
@@ -21795,23 +22024,7 @@
                 </a:solidFill>
                 <a:latin typeface="+mn-lt"/>
               </a:rPr>
-              <a:t>The advantage of pre-built AI options like Cognitive Services is that the models they use under the covers do not need to be trained by you, and you do not need to have the data to train them as a pre-requisite.</a:t>
-            </a:r>
-          </a:p>
-          <a:p>
-            <a:pPr>
-              <a:spcAft>
-                <a:spcPts val="882"/>
-              </a:spcAft>
-            </a:pPr>
-            <a:r>
-              <a:rPr lang="en-US" sz="2400" dirty="0">
-                <a:solidFill>
-                  <a:schemeClr val="tx1"/>
-                </a:solidFill>
-                <a:latin typeface="+mn-lt"/>
-              </a:rPr>
-              <a:t>Automated machine learning picks an algorithm and hyperparameters and thus simplifies and expedite the process of producing a performant model, and you can create your model training experiments in Azure Machine Learning studio without writing a single line of code.</a:t>
+              <a:t>Azure provides a wide range of services to address the needs of AI, from pre-built AI capabilities in Cognitive Services to services that help you to build, train, and deploy your custom AI capabilities using the Azure Machine Learning service and other services from the Microsoft AI stack.</a:t>
             </a:r>
           </a:p>
         </p:txBody>
@@ -21819,7 +22032,7 @@
     </p:spTree>
     <p:extLst>
       <p:ext uri="{BB962C8B-B14F-4D97-AF65-F5344CB8AC3E}">
-        <p14:creationId xmlns:p14="http://schemas.microsoft.com/office/powerpoint/2010/main" val="1459427465"/>
+        <p14:creationId xmlns:p14="http://schemas.microsoft.com/office/powerpoint/2010/main" val="1491462391"/>
       </p:ext>
     </p:extLst>
   </p:cSld>
@@ -22049,19 +22262,28 @@
         <p:spPr/>
         <p:txBody>
           <a:bodyPr>
-            <a:normAutofit/>
+            <a:normAutofit fontScale="90000"/>
           </a:bodyPr>
           <a:lstStyle/>
           <a:p>
             <a:r>
-              <a:rPr lang="en-US" sz="4400" dirty="0">
+              <a:rPr lang="en-US" sz="4900" dirty="0">
                 <a:solidFill>
                   <a:schemeClr val="tx1"/>
                 </a:solidFill>
+                <a:cs typeface="Segoe UI" panose="020B0502040204020203" pitchFamily="34" charset="0"/>
               </a:rPr>
               <a:t>Preferred objections handling</a:t>
             </a:r>
-            <a:endParaRPr lang="en-US" sz="4400" dirty="0">
+            <a:br>
+              <a:rPr lang="en-US" dirty="0">
+                <a:solidFill>
+                  <a:schemeClr val="tx1"/>
+                </a:solidFill>
+                <a:latin typeface="Segoe UI" panose="020B0502040204020203" pitchFamily="34" charset="0"/>
+              </a:rPr>
+            </a:br>
+            <a:endParaRPr lang="en-US" sz="3236" dirty="0">
               <a:solidFill>
                 <a:schemeClr val="tx1"/>
               </a:solidFill>
@@ -22082,8 +22304,8 @@
         </p:nvSpPr>
         <p:spPr>
           <a:xfrm>
-            <a:off x="269239" y="1189176"/>
-            <a:ext cx="11160761" cy="5179873"/>
+            <a:off x="269240" y="1189176"/>
+            <a:ext cx="10649132" cy="5179873"/>
           </a:xfrm>
         </p:spPr>
         <p:txBody>
@@ -22104,7 +22326,7 @@
                   <a:schemeClr val="tx1"/>
                 </a:solidFill>
               </a:rPr>
-              <a:t>We expect some part of our solution would require deep learning. Do you have any prescriptive guidance on how we might choose between investing in understanding and using TensorFlow or the Microsoft Cognitive Toolkit (CNTK)?</a:t>
+              <a:t>We know that there are both pre-built AI and custom AI options. We are confused as to when to choose one over the other. </a:t>
             </a:r>
           </a:p>
           <a:p>
@@ -22120,80 +22342,15 @@
                 </a:solidFill>
                 <a:latin typeface="+mn-lt"/>
               </a:rPr>
-              <a:t>Both TensorFlow and the Microsoft Cognitive Toolkit solve similar problems and have been used successfully by many companies for deep learning solutions.</a:t>
-            </a:r>
-          </a:p>
-          <a:p>
-            <a:pPr>
-              <a:spcAft>
-                <a:spcPts val="882"/>
-              </a:spcAft>
-            </a:pPr>
-            <a:r>
-              <a:rPr lang="en-US" sz="2400" dirty="0">
-                <a:solidFill>
-                  <a:schemeClr val="tx1"/>
-                </a:solidFill>
-                <a:latin typeface="+mn-lt"/>
-              </a:rPr>
-              <a:t>At present, it appears that TensorFlow has a much larger community interest level, which can be measured by the number of stars it has in its GitHub project (which is an order of magnitude larger than that of the Microsoft Cognitive Toolkit)</a:t>
-            </a:r>
-          </a:p>
-          <a:p>
-            <a:pPr>
-              <a:spcAft>
-                <a:spcPts val="882"/>
-              </a:spcAft>
-            </a:pPr>
-            <a:r>
-              <a:rPr lang="en-US" sz="2400" dirty="0">
-                <a:solidFill>
-                  <a:schemeClr val="tx1"/>
-                </a:solidFill>
-                <a:latin typeface="+mn-lt"/>
-              </a:rPr>
-              <a:t>The size of the community means that is likely you will more easily find help online for issues with </a:t>
-            </a:r>
-            <a:r>
-              <a:rPr lang="en-US" sz="2400" dirty="0" err="1">
-                <a:solidFill>
-                  <a:schemeClr val="tx1"/>
-                </a:solidFill>
-                <a:latin typeface="+mn-lt"/>
-              </a:rPr>
-              <a:t>TensorFlow</a:t>
-            </a:r>
-            <a:r>
-              <a:rPr lang="en-US" sz="2400" dirty="0">
-                <a:solidFill>
-                  <a:schemeClr val="tx1"/>
-                </a:solidFill>
-                <a:latin typeface="+mn-lt"/>
-              </a:rPr>
-              <a:t> versus the Microsoft Cognitive Toolkit, which is why it may be a good reason to start with </a:t>
-            </a:r>
-            <a:r>
-              <a:rPr lang="en-US" sz="2400" dirty="0" err="1">
-                <a:solidFill>
-                  <a:schemeClr val="tx1"/>
-                </a:solidFill>
-                <a:latin typeface="+mn-lt"/>
-              </a:rPr>
-              <a:t>TensorFlow</a:t>
-            </a:r>
-            <a:endParaRPr lang="en-US" sz="2400" dirty="0">
-              <a:solidFill>
-                <a:schemeClr val="tx1"/>
-              </a:solidFill>
-              <a:latin typeface="+mn-lt"/>
-            </a:endParaRPr>
+              <a:t>When proving the value of an A.I. or machine learning solution, it can be helpful to start with ready-to-use solutions and then progress into more customized solutions. So, in the case of Azure A.I. services, start with cognitive services like, the Text Analytics API. If more control is needed, try Auto ML. For a fully customizable solution, consider building your own model in Azure ML.</a:t>
+            </a:r>
           </a:p>
         </p:txBody>
       </p:sp>
     </p:spTree>
     <p:extLst>
       <p:ext uri="{BB962C8B-B14F-4D97-AF65-F5344CB8AC3E}">
-        <p14:creationId xmlns:p14="http://schemas.microsoft.com/office/powerpoint/2010/main" val="4153529075"/>
+        <p14:creationId xmlns:p14="http://schemas.microsoft.com/office/powerpoint/2010/main" val="1459427465"/>
       </p:ext>
     </p:extLst>
   </p:cSld>
@@ -22241,6 +22398,198 @@
         <p:spPr/>
         <p:txBody>
           <a:bodyPr>
+            <a:normAutofit/>
+          </a:bodyPr>
+          <a:lstStyle/>
+          <a:p>
+            <a:r>
+              <a:rPr lang="en-US" sz="4400" dirty="0">
+                <a:solidFill>
+                  <a:schemeClr val="tx1"/>
+                </a:solidFill>
+              </a:rPr>
+              <a:t>Preferred objections handling</a:t>
+            </a:r>
+            <a:endParaRPr lang="en-US" sz="4400" dirty="0">
+              <a:solidFill>
+                <a:schemeClr val="tx1"/>
+              </a:solidFill>
+              <a:latin typeface="Segoe UI" panose="020B0502040204020203" pitchFamily="34" charset="0"/>
+            </a:endParaRPr>
+          </a:p>
+        </p:txBody>
+      </p:sp>
+      <p:sp>
+        <p:nvSpPr>
+          <p:cNvPr id="3" name="Content Placeholder 2"/>
+          <p:cNvSpPr>
+            <a:spLocks noGrp="1"/>
+          </p:cNvSpPr>
+          <p:nvPr>
+            <p:ph type="body" sz="quarter" idx="10"/>
+          </p:nvPr>
+        </p:nvSpPr>
+        <p:spPr>
+          <a:xfrm>
+            <a:off x="269239" y="1189176"/>
+            <a:ext cx="11160761" cy="5179873"/>
+          </a:xfrm>
+        </p:spPr>
+        <p:txBody>
+          <a:bodyPr>
+            <a:noAutofit/>
+          </a:bodyPr>
+          <a:lstStyle/>
+          <a:p>
+            <a:pPr marL="0" indent="0">
+              <a:spcAft>
+                <a:spcPts val="882"/>
+              </a:spcAft>
+              <a:buNone/>
+            </a:pPr>
+            <a:r>
+              <a:rPr lang="en-US" sz="2800" dirty="0">
+                <a:solidFill>
+                  <a:schemeClr val="tx1"/>
+                </a:solidFill>
+              </a:rPr>
+              <a:t>We expect some part of our solution would require deep learning. Do you have any prescriptive guidance on how we might choose between investing in understanding and using TensorFlow or the Microsoft Cognitive Toolkit (CNTK)?</a:t>
+            </a:r>
+          </a:p>
+          <a:p>
+            <a:pPr>
+              <a:spcAft>
+                <a:spcPts val="882"/>
+              </a:spcAft>
+            </a:pPr>
+            <a:r>
+              <a:rPr lang="en-US" sz="2400" dirty="0">
+                <a:solidFill>
+                  <a:schemeClr val="tx1"/>
+                </a:solidFill>
+                <a:latin typeface="+mn-lt"/>
+              </a:rPr>
+              <a:t>Both TensorFlow and the Microsoft Cognitive Toolkit solve similar problems and have been used successfully by many companies for deep learning solutions.</a:t>
+            </a:r>
+          </a:p>
+          <a:p>
+            <a:pPr>
+              <a:spcAft>
+                <a:spcPts val="882"/>
+              </a:spcAft>
+            </a:pPr>
+            <a:r>
+              <a:rPr lang="en-US" sz="2400" dirty="0">
+                <a:solidFill>
+                  <a:schemeClr val="tx1"/>
+                </a:solidFill>
+                <a:latin typeface="+mn-lt"/>
+              </a:rPr>
+              <a:t>At present, it appears that TensorFlow has a much larger community interest level, which can be measured by the number of stars it has in its GitHub project (which is an order of magnitude larger than that of the Microsoft Cognitive Toolkit)</a:t>
+            </a:r>
+          </a:p>
+          <a:p>
+            <a:pPr>
+              <a:spcAft>
+                <a:spcPts val="882"/>
+              </a:spcAft>
+            </a:pPr>
+            <a:r>
+              <a:rPr lang="en-US" sz="2400" dirty="0">
+                <a:solidFill>
+                  <a:schemeClr val="tx1"/>
+                </a:solidFill>
+                <a:latin typeface="+mn-lt"/>
+              </a:rPr>
+              <a:t>The size of the community means that is likely you will more easily find help online for issues with </a:t>
+            </a:r>
+            <a:r>
+              <a:rPr lang="en-US" sz="2400" dirty="0" err="1">
+                <a:solidFill>
+                  <a:schemeClr val="tx1"/>
+                </a:solidFill>
+                <a:latin typeface="+mn-lt"/>
+              </a:rPr>
+              <a:t>TensorFlow</a:t>
+            </a:r>
+            <a:r>
+              <a:rPr lang="en-US" sz="2400" dirty="0">
+                <a:solidFill>
+                  <a:schemeClr val="tx1"/>
+                </a:solidFill>
+                <a:latin typeface="+mn-lt"/>
+              </a:rPr>
+              <a:t> versus the Microsoft Cognitive Toolkit, which is why it may be a good reason to start with </a:t>
+            </a:r>
+            <a:r>
+              <a:rPr lang="en-US" sz="2400" dirty="0" err="1">
+                <a:solidFill>
+                  <a:schemeClr val="tx1"/>
+                </a:solidFill>
+                <a:latin typeface="+mn-lt"/>
+              </a:rPr>
+              <a:t>TensorFlow</a:t>
+            </a:r>
+            <a:endParaRPr lang="en-US" sz="2400" dirty="0">
+              <a:solidFill>
+                <a:schemeClr val="tx1"/>
+              </a:solidFill>
+              <a:latin typeface="+mn-lt"/>
+            </a:endParaRPr>
+          </a:p>
+        </p:txBody>
+      </p:sp>
+    </p:spTree>
+    <p:extLst>
+      <p:ext uri="{BB962C8B-B14F-4D97-AF65-F5344CB8AC3E}">
+        <p14:creationId xmlns:p14="http://schemas.microsoft.com/office/powerpoint/2010/main" val="4153529075"/>
+      </p:ext>
+    </p:extLst>
+  </p:cSld>
+  <p:clrMapOvr>
+    <a:masterClrMapping/>
+  </p:clrMapOvr>
+  <mc:AlternateContent xmlns:mc="http://schemas.openxmlformats.org/markup-compatibility/2006" xmlns:p14="http://schemas.microsoft.com/office/powerpoint/2010/main">
+    <mc:Choice Requires="p14">
+      <p:transition p14:dur="0"/>
+    </mc:Choice>
+    <mc:Fallback xmlns="">
+      <p:transition/>
+    </mc:Fallback>
+  </mc:AlternateContent>
+</p:sld>
+</file>
+
+<file path=ppt/slides/slide32.xml><?xml version="1.0" encoding="utf-8"?>
+<p:sld xmlns:a="http://schemas.openxmlformats.org/drawingml/2006/main" xmlns:r="http://schemas.openxmlformats.org/officeDocument/2006/relationships" xmlns:p="http://schemas.openxmlformats.org/presentationml/2006/main">
+  <p:cSld>
+    <p:spTree>
+      <p:nvGrpSpPr>
+        <p:cNvPr id="1" name=""/>
+        <p:cNvGrpSpPr/>
+        <p:nvPr/>
+      </p:nvGrpSpPr>
+      <p:grpSpPr>
+        <a:xfrm>
+          <a:off x="0" y="0"/>
+          <a:ext cx="0" cy="0"/>
+          <a:chOff x="0" y="0"/>
+          <a:chExt cx="0" cy="0"/>
+        </a:xfrm>
+      </p:grpSpPr>
+      <p:sp>
+        <p:nvSpPr>
+          <p:cNvPr id="2" name="Title 1"/>
+          <p:cNvSpPr>
+            <a:spLocks noGrp="1"/>
+          </p:cNvSpPr>
+          <p:nvPr>
+            <p:ph type="title"/>
+          </p:nvPr>
+        </p:nvSpPr>
+        <p:spPr/>
+        <p:txBody>
+          <a:bodyPr>
             <a:normAutofit fontScale="90000"/>
           </a:bodyPr>
           <a:lstStyle/>
@@ -22378,7 +22727,7 @@
 </p:sld>
 </file>
 
-<file path=ppt/slides/slide32.xml><?xml version="1.0" encoding="utf-8"?>
+<file path=ppt/slides/slide33.xml><?xml version="1.0" encoding="utf-8"?>
 <p:sld xmlns:a="http://schemas.openxmlformats.org/drawingml/2006/main" xmlns:r="http://schemas.openxmlformats.org/officeDocument/2006/relationships" xmlns:p="http://schemas.openxmlformats.org/presentationml/2006/main">
   <p:cSld>
     <p:bg>

</xml_diff>

<commit_message>
Nov 2021 - MCW name change
</commit_message>
<xml_diff>
--- a/Whiteboard design session/WDS trainer presentation - Cognitive Services and deep learning.pptx
+++ b/Whiteboard design session/WDS trainer presentation - Cognitive Services and deep learning.pptx
@@ -233,7 +233,7 @@
           <a:p>
             <a:fld id="{52A13B17-C506-4D51-BB37-16B365906619}" type="datetimeFigureOut">
               <a:rPr lang="en-US" smtClean="0"/>
-              <a:t>11/10/21</a:t>
+              <a:t>11/12/21</a:t>
             </a:fld>
             <a:endParaRPr lang="en-US" dirty="0"/>
           </a:p>
@@ -3015,7 +3015,7 @@
                   <a:prstClr val="black"/>
                 </a:solidFill>
               </a:rPr>
-              <a:t>11/10/21 9:54 AM</a:t>
+              <a:t>11/12/21 9:55 AM</a:t>
             </a:fld>
             <a:endParaRPr lang="en-US" dirty="0">
               <a:solidFill>
@@ -15529,7 +15529,7 @@
         </p:nvSpPr>
         <p:spPr>
           <a:xfrm>
-            <a:off x="269302" y="2084187"/>
+            <a:off x="269301" y="2080090"/>
             <a:ext cx="7171335" cy="899336"/>
           </a:xfrm>
         </p:spPr>
@@ -15539,38 +15539,8 @@
           <a:p>
             <a:r>
               <a:rPr lang="en-US" dirty="0"/>
-              <a:t>Cognitive Services and deep learning</a:t>
-            </a:r>
-          </a:p>
-        </p:txBody>
-      </p:sp>
-      <p:sp>
-        <p:nvSpPr>
-          <p:cNvPr id="3" name="Text Placeholder 2">
-            <a:extLst>
-              <a:ext uri="{FF2B5EF4-FFF2-40B4-BE49-F238E27FC236}">
-                <a16:creationId xmlns:a16="http://schemas.microsoft.com/office/drawing/2014/main" id="{C83DC502-2B62-4F9B-A8B3-D2EF25BCD06C}"/>
-              </a:ext>
-            </a:extLst>
-          </p:cNvPr>
-          <p:cNvSpPr>
-            <a:spLocks noGrp="1"/>
-          </p:cNvSpPr>
-          <p:nvPr>
-            <p:ph type="body" sz="quarter" idx="12"/>
-          </p:nvPr>
-        </p:nvSpPr>
-        <p:spPr>
-          <a:xfrm>
-            <a:off x="269301" y="3878574"/>
-            <a:ext cx="7171337" cy="1792326"/>
-          </a:xfrm>
-        </p:spPr>
-        <p:txBody>
-          <a:bodyPr/>
-          <a:lstStyle/>
-          <a:p>
-            <a:endParaRPr lang="en-US" dirty="0"/>
+              <a:t>Analyzing text with Azure Machine Learning and Cognitive Services </a:t>
+            </a:r>
           </a:p>
         </p:txBody>
       </p:sp>

</xml_diff>